<commit_message>
Plot changed for ppt
</commit_message>
<xml_diff>
--- a/Final_Presentation_Borvendeg_Hantke.pptx
+++ b/Final_Presentation_Borvendeg_Hantke.pptx
@@ -14060,7 +14060,12 @@
             <p:ph idx="1"/>
           </p:nvPr>
         </p:nvSpPr>
-        <p:spPr/>
+        <p:spPr>
+          <a:xfrm>
+            <a:off x="319089" y="2510913"/>
+            <a:ext cx="8508999" cy="3962400"/>
+          </a:xfrm>
+        </p:spPr>
         <p:txBody>
           <a:bodyPr/>
           <a:lstStyle/>
@@ -14071,47 +14076,7 @@
                   <a:srgbClr val="FFFF00"/>
                 </a:highlight>
               </a:rPr>
-              <a:t>Best Model </a:t>
-            </a:r>
-            <a:r>
-              <a:rPr lang="de-DE" dirty="0" err="1">
-                <a:highlight>
-                  <a:srgbClr val="FFFF00"/>
-                </a:highlight>
-              </a:rPr>
-              <a:t>or</a:t>
-            </a:r>
-            <a:r>
-              <a:rPr lang="de-DE" dirty="0">
-                <a:highlight>
-                  <a:srgbClr val="FFFF00"/>
-                </a:highlight>
-              </a:rPr>
-              <a:t> </a:t>
-            </a:r>
-            <a:r>
-              <a:rPr lang="de-DE" dirty="0" err="1">
-                <a:highlight>
-                  <a:srgbClr val="FFFF00"/>
-                </a:highlight>
-              </a:rPr>
-              <a:t>even</a:t>
-            </a:r>
-            <a:r>
-              <a:rPr lang="de-DE" dirty="0">
-                <a:highlight>
-                  <a:srgbClr val="FFFF00"/>
-                </a:highlight>
-              </a:rPr>
-              <a:t> all 4 </a:t>
-            </a:r>
-            <a:r>
-              <a:rPr lang="de-DE" dirty="0" err="1">
-                <a:highlight>
-                  <a:srgbClr val="FFFF00"/>
-                </a:highlight>
-              </a:rPr>
-              <a:t>models</a:t>
+              <a:t>Best Model</a:t>
             </a:r>
             <a:endParaRPr lang="en-GB" dirty="0">
               <a:highlight>
@@ -14333,51 +14298,27 @@
               <a:buChar char="-"/>
             </a:pPr>
             <a:r>
-              <a:rPr lang="de-DE" dirty="0" err="1">
-                <a:highlight>
-                  <a:srgbClr val="FFFF00"/>
-                </a:highlight>
-              </a:rPr>
+              <a:rPr lang="de-DE" dirty="0" err="1"/>
               <a:t>Statistically</a:t>
             </a:r>
             <a:r>
-              <a:rPr lang="de-DE" dirty="0">
-                <a:highlight>
-                  <a:srgbClr val="FFFF00"/>
-                </a:highlight>
-              </a:rPr>
+              <a:rPr lang="de-DE" dirty="0"/>
               <a:t> </a:t>
             </a:r>
             <a:r>
-              <a:rPr lang="de-DE" dirty="0" err="1">
-                <a:highlight>
-                  <a:srgbClr val="FFFF00"/>
-                </a:highlight>
-              </a:rPr>
+              <a:rPr lang="de-DE" dirty="0" err="1"/>
               <a:t>significant</a:t>
             </a:r>
             <a:r>
-              <a:rPr lang="de-DE" dirty="0">
-                <a:highlight>
-                  <a:srgbClr val="FFFF00"/>
-                </a:highlight>
-              </a:rPr>
+              <a:rPr lang="de-DE" dirty="0"/>
               <a:t> </a:t>
             </a:r>
             <a:r>
-              <a:rPr lang="de-DE" dirty="0" err="1">
-                <a:highlight>
-                  <a:srgbClr val="FFFF00"/>
-                </a:highlight>
-              </a:rPr>
+              <a:rPr lang="de-DE" dirty="0" err="1"/>
               <a:t>parameters</a:t>
             </a:r>
             <a:r>
-              <a:rPr lang="de-DE" dirty="0">
-                <a:highlight>
-                  <a:srgbClr val="FFFF00"/>
-                </a:highlight>
-              </a:rPr>
+              <a:rPr lang="de-DE" dirty="0"/>
               <a:t>:</a:t>
             </a:r>
           </a:p>
@@ -14390,18 +14331,26 @@
               <a:buChar char="•"/>
             </a:pPr>
             <a:r>
-              <a:rPr lang="de-DE" dirty="0" err="1">
-                <a:highlight>
-                  <a:srgbClr val="FFFF00"/>
-                </a:highlight>
-              </a:rPr>
-              <a:t>xy</a:t>
-            </a:r>
-            <a:endParaRPr lang="de-DE" dirty="0">
-              <a:highlight>
-                <a:srgbClr val="FFFF00"/>
-              </a:highlight>
-            </a:endParaRPr>
+              <a:rPr lang="de-DE" dirty="0" err="1"/>
+              <a:t>Capacity</a:t>
+            </a:r>
+            <a:r>
+              <a:rPr lang="de-DE" dirty="0"/>
+              <a:t> </a:t>
+            </a:r>
+            <a:r>
+              <a:rPr lang="de-DE" dirty="0" err="1"/>
+              <a:t>price</a:t>
+            </a:r>
+            <a:r>
+              <a:rPr lang="de-DE" dirty="0"/>
+              <a:t> </a:t>
+            </a:r>
+            <a:r>
+              <a:rPr lang="de-DE" dirty="0" err="1"/>
+              <a:t>features</a:t>
+            </a:r>
+            <a:endParaRPr lang="de-DE" dirty="0"/>
           </a:p>
           <a:p>
             <a:pPr marL="285750" indent="-285750">
@@ -14412,165 +14361,105 @@
               <a:buChar char="-"/>
             </a:pPr>
             <a:r>
-              <a:rPr lang="de-DE" dirty="0" err="1">
-                <a:highlight>
-                  <a:srgbClr val="FFFF00"/>
-                </a:highlight>
-              </a:rPr>
+              <a:rPr lang="de-DE" dirty="0" err="1"/>
               <a:t>Variance</a:t>
             </a:r>
             <a:r>
-              <a:rPr lang="de-DE" dirty="0">
-                <a:highlight>
-                  <a:srgbClr val="FFFF00"/>
-                </a:highlight>
-              </a:rPr>
+              <a:rPr lang="de-DE" dirty="0"/>
               <a:t> in “</a:t>
             </a:r>
             <a:r>
-              <a:rPr lang="de-DE" dirty="0" err="1">
-                <a:highlight>
-                  <a:srgbClr val="FFFF00"/>
-                </a:highlight>
-              </a:rPr>
+              <a:rPr lang="de-DE" dirty="0" err="1"/>
               <a:t>overinstalled</a:t>
             </a:r>
             <a:r>
-              <a:rPr lang="de-DE" dirty="0">
-                <a:highlight>
-                  <a:srgbClr val="FFFF00"/>
-                </a:highlight>
-              </a:rPr>
+              <a:rPr lang="de-DE" dirty="0"/>
               <a:t>“ </a:t>
             </a:r>
             <a:r>
-              <a:rPr lang="de-DE" dirty="0" err="1">
-                <a:highlight>
-                  <a:srgbClr val="FFFF00"/>
-                </a:highlight>
-              </a:rPr>
+              <a:rPr lang="de-DE" dirty="0" err="1"/>
               <a:t>capacity</a:t>
             </a:r>
             <a:r>
-              <a:rPr lang="de-DE" dirty="0">
-                <a:highlight>
-                  <a:srgbClr val="FFFF00"/>
-                </a:highlight>
-              </a:rPr>
+              <a:rPr lang="de-DE" dirty="0"/>
               <a:t> </a:t>
             </a:r>
             <a:r>
-              <a:rPr lang="de-DE" dirty="0" err="1">
-                <a:highlight>
-                  <a:srgbClr val="FFFF00"/>
-                </a:highlight>
-              </a:rPr>
+              <a:rPr lang="de-DE" dirty="0" err="1"/>
               <a:t>that</a:t>
             </a:r>
             <a:r>
-              <a:rPr lang="de-DE" dirty="0">
-                <a:highlight>
-                  <a:srgbClr val="FFFF00"/>
-                </a:highlight>
-              </a:rPr>
+              <a:rPr lang="de-DE" dirty="0"/>
               <a:t> </a:t>
             </a:r>
             <a:r>
-              <a:rPr lang="de-DE" dirty="0" err="1">
-                <a:highlight>
-                  <a:srgbClr val="FFFF00"/>
-                </a:highlight>
-              </a:rPr>
+              <a:rPr lang="de-DE" dirty="0" err="1"/>
               <a:t>can</a:t>
             </a:r>
             <a:r>
-              <a:rPr lang="de-DE" dirty="0">
-                <a:highlight>
-                  <a:srgbClr val="FFFF00"/>
-                </a:highlight>
-              </a:rPr>
+              <a:rPr lang="de-DE" dirty="0"/>
               <a:t> </a:t>
             </a:r>
             <a:r>
-              <a:rPr lang="de-DE" dirty="0" err="1">
-                <a:highlight>
-                  <a:srgbClr val="FFFF00"/>
-                </a:highlight>
-              </a:rPr>
+              <a:rPr lang="de-DE" dirty="0" err="1"/>
               <a:t>be</a:t>
             </a:r>
             <a:r>
-              <a:rPr lang="de-DE" dirty="0">
-                <a:highlight>
-                  <a:srgbClr val="FFFF00"/>
-                </a:highlight>
-              </a:rPr>
+              <a:rPr lang="de-DE" dirty="0"/>
               <a:t> </a:t>
             </a:r>
             <a:r>
-              <a:rPr lang="de-DE" dirty="0" err="1">
-                <a:highlight>
-                  <a:srgbClr val="FFFF00"/>
-                </a:highlight>
-              </a:rPr>
+              <a:rPr lang="de-DE" dirty="0" err="1"/>
               <a:t>described</a:t>
             </a:r>
             <a:r>
-              <a:rPr lang="de-DE" dirty="0">
-                <a:highlight>
-                  <a:srgbClr val="FFFF00"/>
-                </a:highlight>
-              </a:rPr>
+              <a:rPr lang="de-DE" dirty="0"/>
               <a:t> </a:t>
             </a:r>
             <a:r>
-              <a:rPr lang="de-DE" dirty="0" err="1">
-                <a:highlight>
-                  <a:srgbClr val="FFFF00"/>
-                </a:highlight>
-              </a:rPr>
+              <a:rPr lang="de-DE" dirty="0" err="1"/>
               <a:t>by</a:t>
             </a:r>
             <a:r>
-              <a:rPr lang="de-DE" dirty="0">
-                <a:highlight>
-                  <a:srgbClr val="FFFF00"/>
-                </a:highlight>
-              </a:rPr>
+              <a:rPr lang="de-DE" dirty="0"/>
               <a:t> </a:t>
             </a:r>
             <a:r>
-              <a:rPr lang="de-DE" dirty="0" err="1">
-                <a:highlight>
-                  <a:srgbClr val="FFFF00"/>
-                </a:highlight>
-              </a:rPr>
+              <a:rPr lang="de-DE" dirty="0" err="1"/>
               <a:t>the</a:t>
             </a:r>
             <a:r>
-              <a:rPr lang="de-DE" dirty="0">
-                <a:highlight>
-                  <a:srgbClr val="FFFF00"/>
-                </a:highlight>
-              </a:rPr>
+              <a:rPr lang="de-DE" dirty="0"/>
               <a:t> </a:t>
             </a:r>
             <a:r>
-              <a:rPr lang="de-DE" dirty="0" err="1">
-                <a:highlight>
-                  <a:srgbClr val="FFFF00"/>
-                </a:highlight>
-              </a:rPr>
+              <a:rPr lang="de-DE" dirty="0" err="1"/>
               <a:t>model</a:t>
             </a:r>
             <a:r>
-              <a:rPr lang="de-DE" dirty="0">
-                <a:highlight>
-                  <a:srgbClr val="FFFF00"/>
-                </a:highlight>
-              </a:rPr>
+              <a:rPr lang="de-DE" dirty="0"/>
               <a:t>:</a:t>
             </a:r>
+            <a:br>
+              <a:rPr lang="de-DE" dirty="0"/>
+            </a:br>
+            <a:r>
+              <a:rPr lang="de-DE" dirty="0"/>
+              <a:t>R² = 33-55%, </a:t>
+            </a:r>
+            <a:r>
+              <a:rPr lang="de-DE" dirty="0" err="1"/>
+              <a:t>depending</a:t>
+            </a:r>
+            <a:r>
+              <a:rPr lang="de-DE" dirty="0"/>
+              <a:t> on </a:t>
+            </a:r>
+            <a:r>
+              <a:rPr lang="de-DE" dirty="0" err="1"/>
+              <a:t>locality</a:t>
+            </a:r>
+            <a:endParaRPr lang="de-DE" dirty="0"/>
           </a:p>
           <a:p>
             <a:pPr marL="285750" indent="-285750">
@@ -14602,76 +14491,332 @@
               <a:buChar char="-"/>
             </a:pPr>
             <a:r>
+              <a:rPr lang="de-DE" dirty="0" err="1"/>
+              <a:t>Reliability</a:t>
+            </a:r>
+            <a:r>
+              <a:rPr lang="de-DE" dirty="0"/>
+              <a:t> </a:t>
+            </a:r>
+            <a:r>
+              <a:rPr lang="de-DE" dirty="0" err="1"/>
+              <a:t>of</a:t>
+            </a:r>
+            <a:r>
+              <a:rPr lang="de-DE" dirty="0"/>
+              <a:t> </a:t>
+            </a:r>
+            <a:r>
+              <a:rPr lang="de-DE" dirty="0" err="1"/>
+              <a:t>supply</a:t>
+            </a:r>
+            <a:r>
+              <a:rPr lang="de-DE" dirty="0"/>
+              <a:t> not </a:t>
+            </a:r>
+            <a:r>
+              <a:rPr lang="de-DE" dirty="0" err="1"/>
+              <a:t>ensured</a:t>
+            </a:r>
+            <a:r>
+              <a:rPr lang="de-DE" dirty="0"/>
+              <a:t> </a:t>
+            </a:r>
+            <a:r>
+              <a:rPr lang="de-DE" dirty="0" err="1"/>
+              <a:t>by</a:t>
+            </a:r>
+            <a:r>
+              <a:rPr lang="de-DE" dirty="0"/>
+              <a:t> </a:t>
+            </a:r>
+            <a:r>
+              <a:rPr lang="de-DE" dirty="0" err="1"/>
+              <a:t>capacity</a:t>
+            </a:r>
+            <a:r>
+              <a:rPr lang="de-DE" dirty="0"/>
+              <a:t> </a:t>
+            </a:r>
+            <a:r>
+              <a:rPr lang="de-DE" dirty="0" err="1"/>
+              <a:t>prices</a:t>
+            </a:r>
+            <a:r>
+              <a:rPr lang="de-DE" dirty="0"/>
+              <a:t> </a:t>
+            </a:r>
+            <a:r>
+              <a:rPr lang="de-DE" dirty="0" err="1"/>
+              <a:t>or</a:t>
+            </a:r>
+            <a:r>
+              <a:rPr lang="de-DE" dirty="0"/>
+              <a:t> </a:t>
+            </a:r>
+            <a:r>
+              <a:rPr lang="de-DE" dirty="0" err="1"/>
+              <a:t>day-ahead</a:t>
+            </a:r>
+            <a:r>
+              <a:rPr lang="de-DE" dirty="0"/>
+              <a:t> </a:t>
+            </a:r>
+            <a:r>
+              <a:rPr lang="de-DE" dirty="0" err="1"/>
+              <a:t>electricity</a:t>
+            </a:r>
+            <a:r>
+              <a:rPr lang="de-DE" dirty="0"/>
+              <a:t> </a:t>
+            </a:r>
+            <a:r>
+              <a:rPr lang="de-DE" dirty="0" err="1"/>
+              <a:t>prices</a:t>
+            </a:r>
+            <a:endParaRPr lang="de-DE" dirty="0"/>
+          </a:p>
+          <a:p>
+            <a:pPr marL="285750" indent="-285750">
+              <a:spcBef>
+                <a:spcPts val="600"/>
+              </a:spcBef>
+              <a:buFontTx/>
+              <a:buChar char="-"/>
+            </a:pPr>
+            <a:r>
+              <a:rPr lang="de-DE" dirty="0" err="1"/>
+              <a:t>Reliability</a:t>
+            </a:r>
+            <a:r>
+              <a:rPr lang="de-DE" dirty="0"/>
+              <a:t> </a:t>
+            </a:r>
+            <a:r>
+              <a:rPr lang="de-DE" dirty="0" err="1"/>
+              <a:t>forced</a:t>
+            </a:r>
+            <a:r>
+              <a:rPr lang="de-DE" dirty="0"/>
+              <a:t> </a:t>
+            </a:r>
+            <a:r>
+              <a:rPr lang="de-DE" dirty="0" err="1"/>
+              <a:t>by</a:t>
+            </a:r>
+            <a:r>
+              <a:rPr lang="de-DE" dirty="0"/>
+              <a:t> </a:t>
+            </a:r>
+            <a:r>
+              <a:rPr lang="de-DE" dirty="0" err="1"/>
+              <a:t>calculated</a:t>
+            </a:r>
+            <a:r>
+              <a:rPr lang="de-DE" dirty="0"/>
+              <a:t> UCAP </a:t>
+            </a:r>
+            <a:r>
+              <a:rPr lang="de-DE" dirty="0" err="1"/>
+              <a:t>that</a:t>
+            </a:r>
+            <a:r>
+              <a:rPr lang="de-DE" dirty="0"/>
+              <a:t> </a:t>
+            </a:r>
+            <a:r>
+              <a:rPr lang="de-DE" dirty="0" err="1"/>
+              <a:t>each</a:t>
+            </a:r>
+            <a:r>
+              <a:rPr lang="de-DE" dirty="0"/>
+              <a:t> </a:t>
+            </a:r>
+            <a:r>
+              <a:rPr lang="de-DE" dirty="0" err="1"/>
+              <a:t>load</a:t>
+            </a:r>
+            <a:r>
+              <a:rPr lang="de-DE" dirty="0"/>
+              <a:t> </a:t>
+            </a:r>
+            <a:r>
+              <a:rPr lang="de-DE" dirty="0" err="1"/>
+              <a:t>serving</a:t>
+            </a:r>
+            <a:r>
+              <a:rPr lang="de-DE" dirty="0"/>
+              <a:t> </a:t>
+            </a:r>
+            <a:r>
+              <a:rPr lang="de-DE" dirty="0" err="1"/>
+              <a:t>entity</a:t>
+            </a:r>
+            <a:r>
+              <a:rPr lang="de-DE" dirty="0"/>
+              <a:t> </a:t>
+            </a:r>
+            <a:r>
+              <a:rPr lang="de-DE" dirty="0" err="1"/>
+              <a:t>has</a:t>
+            </a:r>
+            <a:r>
+              <a:rPr lang="de-DE" dirty="0"/>
+              <a:t> </a:t>
+            </a:r>
+            <a:r>
+              <a:rPr lang="de-DE" dirty="0" err="1"/>
+              <a:t>to</a:t>
+            </a:r>
+            <a:r>
+              <a:rPr lang="de-DE" dirty="0"/>
+              <a:t> </a:t>
+            </a:r>
+            <a:r>
+              <a:rPr lang="de-DE" dirty="0" err="1"/>
+              <a:t>procure</a:t>
+            </a:r>
+            <a:endParaRPr lang="de-DE" dirty="0"/>
+          </a:p>
+          <a:p>
+            <a:pPr marL="285750" indent="-285750">
+              <a:spcBef>
+                <a:spcPts val="600"/>
+              </a:spcBef>
+              <a:buFont typeface="Wingdings" panose="05000000000000000000" pitchFamily="2" charset="2"/>
+              <a:buChar char="à"/>
+            </a:pPr>
+            <a:r>
               <a:rPr lang="de-DE" dirty="0" err="1">
-                <a:highlight>
-                  <a:srgbClr val="FFFF00"/>
-                </a:highlight>
+                <a:sym typeface="Wingdings" panose="05000000000000000000" pitchFamily="2" charset="2"/>
               </a:rPr>
-              <a:t>Reliability</a:t>
+              <a:t>Capacity</a:t>
             </a:r>
             <a:r>
               <a:rPr lang="de-DE" dirty="0">
-                <a:highlight>
-                  <a:srgbClr val="FFFF00"/>
-                </a:highlight>
+                <a:sym typeface="Wingdings" panose="05000000000000000000" pitchFamily="2" charset="2"/>
               </a:rPr>
               <a:t> </a:t>
             </a:r>
             <a:r>
               <a:rPr lang="de-DE" dirty="0" err="1">
-                <a:highlight>
-                  <a:srgbClr val="FFFF00"/>
-                </a:highlight>
+                <a:sym typeface="Wingdings" panose="05000000000000000000" pitchFamily="2" charset="2"/>
+              </a:rPr>
+              <a:t>prices</a:t>
+            </a:r>
+            <a:r>
+              <a:rPr lang="de-DE" dirty="0">
+                <a:sym typeface="Wingdings" panose="05000000000000000000" pitchFamily="2" charset="2"/>
+              </a:rPr>
+              <a:t> </a:t>
+            </a:r>
+            <a:r>
+              <a:rPr lang="de-DE" dirty="0" err="1">
+                <a:sym typeface="Wingdings" panose="05000000000000000000" pitchFamily="2" charset="2"/>
+              </a:rPr>
+              <a:t>are</a:t>
+            </a:r>
+            <a:r>
+              <a:rPr lang="de-DE" dirty="0">
+                <a:sym typeface="Wingdings" panose="05000000000000000000" pitchFamily="2" charset="2"/>
+              </a:rPr>
+              <a:t> </a:t>
+            </a:r>
+            <a:r>
+              <a:rPr lang="de-DE" dirty="0" err="1">
+                <a:sym typeface="Wingdings" panose="05000000000000000000" pitchFamily="2" charset="2"/>
+              </a:rPr>
+              <a:t>the</a:t>
+            </a:r>
+            <a:r>
+              <a:rPr lang="de-DE" dirty="0">
+                <a:sym typeface="Wingdings" panose="05000000000000000000" pitchFamily="2" charset="2"/>
+              </a:rPr>
+              <a:t> </a:t>
+            </a:r>
+            <a:r>
+              <a:rPr lang="de-DE" dirty="0" err="1">
+                <a:sym typeface="Wingdings" panose="05000000000000000000" pitchFamily="2" charset="2"/>
+              </a:rPr>
+              <a:t>reflection</a:t>
+            </a:r>
+            <a:r>
+              <a:rPr lang="de-DE" dirty="0">
+                <a:sym typeface="Wingdings" panose="05000000000000000000" pitchFamily="2" charset="2"/>
+              </a:rPr>
+              <a:t> </a:t>
+            </a:r>
+            <a:r>
+              <a:rPr lang="de-DE" dirty="0" err="1">
+                <a:sym typeface="Wingdings" panose="05000000000000000000" pitchFamily="2" charset="2"/>
               </a:rPr>
               <a:t>of</a:t>
             </a:r>
             <a:r>
               <a:rPr lang="de-DE" dirty="0">
-                <a:highlight>
-                  <a:srgbClr val="FFFF00"/>
-                </a:highlight>
+                <a:sym typeface="Wingdings" panose="05000000000000000000" pitchFamily="2" charset="2"/>
+              </a:rPr>
+              <a:t> a </a:t>
+            </a:r>
+            <a:r>
+              <a:rPr lang="de-DE" dirty="0" err="1">
+                <a:sym typeface="Wingdings" panose="05000000000000000000" pitchFamily="2" charset="2"/>
+              </a:rPr>
+              <a:t>technical</a:t>
+            </a:r>
+            <a:r>
+              <a:rPr lang="de-DE" dirty="0">
+                <a:sym typeface="Wingdings" panose="05000000000000000000" pitchFamily="2" charset="2"/>
               </a:rPr>
               <a:t> </a:t>
             </a:r>
             <a:r>
               <a:rPr lang="de-DE" dirty="0" err="1">
-                <a:highlight>
-                  <a:srgbClr val="FFFF00"/>
-                </a:highlight>
+                <a:sym typeface="Wingdings" panose="05000000000000000000" pitchFamily="2" charset="2"/>
               </a:rPr>
-              <a:t>supply</a:t>
+              <a:t>decision</a:t>
             </a:r>
             <a:r>
               <a:rPr lang="de-DE" dirty="0">
-                <a:highlight>
-                  <a:srgbClr val="FFFF00"/>
-                </a:highlight>
+                <a:sym typeface="Wingdings" panose="05000000000000000000" pitchFamily="2" charset="2"/>
               </a:rPr>
               <a:t> </a:t>
             </a:r>
             <a:r>
               <a:rPr lang="de-DE" dirty="0" err="1">
-                <a:highlight>
-                  <a:srgbClr val="FFFF00"/>
-                </a:highlight>
+                <a:sym typeface="Wingdings" panose="05000000000000000000" pitchFamily="2" charset="2"/>
               </a:rPr>
-              <a:t>ensured</a:t>
+              <a:t>made</a:t>
             </a:r>
             <a:r>
               <a:rPr lang="de-DE" dirty="0">
-                <a:highlight>
-                  <a:srgbClr val="FFFF00"/>
-                </a:highlight>
+                <a:sym typeface="Wingdings" panose="05000000000000000000" pitchFamily="2" charset="2"/>
               </a:rPr>
               <a:t> </a:t>
             </a:r>
             <a:r>
               <a:rPr lang="de-DE" dirty="0" err="1">
-                <a:highlight>
-                  <a:srgbClr val="FFFF00"/>
-                </a:highlight>
+                <a:sym typeface="Wingdings" panose="05000000000000000000" pitchFamily="2" charset="2"/>
               </a:rPr>
               <a:t>by</a:t>
+            </a:r>
+            <a:r>
+              <a:rPr lang="de-DE" dirty="0">
+                <a:sym typeface="Wingdings" panose="05000000000000000000" pitchFamily="2" charset="2"/>
+              </a:rPr>
+              <a:t> </a:t>
+            </a:r>
+            <a:r>
+              <a:rPr lang="de-DE" dirty="0" err="1">
+                <a:sym typeface="Wingdings" panose="05000000000000000000" pitchFamily="2" charset="2"/>
+              </a:rPr>
+              <a:t>the</a:t>
+            </a:r>
+            <a:r>
+              <a:rPr lang="de-DE" dirty="0">
+                <a:sym typeface="Wingdings" panose="05000000000000000000" pitchFamily="2" charset="2"/>
+              </a:rPr>
+              <a:t> ISO</a:t>
             </a:r>
             <a:endParaRPr lang="de-DE" dirty="0">
               <a:highlight>
@@ -14855,7 +15000,7 @@
         </p:blipFill>
         <p:spPr>
           <a:xfrm>
-            <a:off x="323083" y="3468328"/>
+            <a:off x="323083" y="3743631"/>
             <a:ext cx="396000" cy="396000"/>
           </a:xfrm>
           <a:prstGeom prst="rect">
@@ -14926,19 +15071,110 @@
             </a:pPr>
             <a:r>
               <a:rPr lang="de-DE" b="1" dirty="0"/>
-              <a:t>Interpretation </a:t>
-            </a:r>
-            <a:r>
-              <a:rPr lang="de-DE" b="1" dirty="0" err="1"/>
-              <a:t>of</a:t>
-            </a:r>
-            <a:r>
-              <a:rPr lang="de-DE" b="1" dirty="0"/>
-              <a:t> </a:t>
+              <a:t>Model </a:t>
             </a:r>
             <a:r>
               <a:rPr lang="de-DE" b="1" dirty="0" err="1"/>
               <a:t>results</a:t>
+            </a:r>
+            <a:r>
+              <a:rPr lang="de-DE" b="1" dirty="0"/>
+              <a:t> vs. </a:t>
+            </a:r>
+            <a:r>
+              <a:rPr lang="de-DE" b="1" dirty="0" err="1"/>
+              <a:t>data</a:t>
+            </a:r>
+            <a:r>
+              <a:rPr lang="de-DE" b="1" dirty="0"/>
+              <a:t>:</a:t>
+            </a:r>
+          </a:p>
+          <a:p>
+            <a:pPr>
+              <a:spcBef>
+                <a:spcPts val="600"/>
+              </a:spcBef>
+            </a:pPr>
+            <a:endParaRPr lang="de-DE" dirty="0"/>
+          </a:p>
+          <a:p>
+            <a:pPr>
+              <a:spcBef>
+                <a:spcPts val="600"/>
+              </a:spcBef>
+            </a:pPr>
+            <a:endParaRPr lang="de-DE" dirty="0"/>
+          </a:p>
+          <a:p>
+            <a:pPr>
+              <a:spcBef>
+                <a:spcPts val="600"/>
+              </a:spcBef>
+            </a:pPr>
+            <a:endParaRPr lang="de-DE" dirty="0"/>
+          </a:p>
+          <a:p>
+            <a:pPr>
+              <a:spcBef>
+                <a:spcPts val="600"/>
+              </a:spcBef>
+            </a:pPr>
+            <a:endParaRPr lang="de-DE" dirty="0"/>
+          </a:p>
+          <a:p>
+            <a:pPr>
+              <a:spcBef>
+                <a:spcPts val="600"/>
+              </a:spcBef>
+            </a:pPr>
+            <a:endParaRPr lang="de-DE" dirty="0"/>
+          </a:p>
+          <a:p>
+            <a:pPr>
+              <a:spcBef>
+                <a:spcPts val="600"/>
+              </a:spcBef>
+            </a:pPr>
+            <a:endParaRPr lang="de-DE" dirty="0"/>
+          </a:p>
+          <a:p>
+            <a:pPr>
+              <a:spcBef>
+                <a:spcPts val="600"/>
+              </a:spcBef>
+            </a:pPr>
+            <a:endParaRPr lang="de-DE" dirty="0"/>
+          </a:p>
+          <a:p>
+            <a:pPr>
+              <a:spcBef>
+                <a:spcPts val="600"/>
+              </a:spcBef>
+            </a:pPr>
+            <a:endParaRPr lang="de-DE" dirty="0"/>
+          </a:p>
+          <a:p>
+            <a:pPr>
+              <a:spcBef>
+                <a:spcPts val="600"/>
+              </a:spcBef>
+            </a:pPr>
+            <a:endParaRPr lang="de-DE" dirty="0"/>
+          </a:p>
+          <a:p>
+            <a:pPr>
+              <a:spcBef>
+                <a:spcPts val="600"/>
+              </a:spcBef>
+            </a:pPr>
+            <a:r>
+              <a:rPr lang="de-DE" b="1" dirty="0"/>
+              <a:t>Statistical </a:t>
+            </a:r>
+            <a:r>
+              <a:rPr lang="de-DE" b="1" dirty="0" err="1"/>
+              <a:t>problems</a:t>
             </a:r>
             <a:r>
               <a:rPr lang="de-DE" b="1" dirty="0"/>
@@ -14954,324 +15190,10 @@
               <a:buChar char="-"/>
             </a:pPr>
             <a:r>
-              <a:rPr lang="de-DE" dirty="0" err="1">
-                <a:highlight>
-                  <a:srgbClr val="FFFF00"/>
-                </a:highlight>
-              </a:rPr>
-              <a:t>Differences</a:t>
-            </a:r>
-            <a:r>
-              <a:rPr lang="de-DE" dirty="0">
-                <a:highlight>
-                  <a:srgbClr val="FFFF00"/>
-                </a:highlight>
-              </a:rPr>
-              <a:t> in </a:t>
-            </a:r>
-            <a:r>
-              <a:rPr lang="de-DE" dirty="0" err="1">
-                <a:highlight>
-                  <a:srgbClr val="FFFF00"/>
-                </a:highlight>
-              </a:rPr>
-              <a:t>results</a:t>
-            </a:r>
-            <a:r>
-              <a:rPr lang="de-DE" dirty="0">
-                <a:highlight>
-                  <a:srgbClr val="FFFF00"/>
-                </a:highlight>
-              </a:rPr>
-              <a:t> in different </a:t>
-            </a:r>
-            <a:r>
-              <a:rPr lang="de-DE" dirty="0" err="1">
-                <a:highlight>
-                  <a:srgbClr val="FFFF00"/>
-                </a:highlight>
-              </a:rPr>
-              <a:t>localities</a:t>
-            </a:r>
-            <a:endParaRPr lang="de-DE" dirty="0">
-              <a:highlight>
-                <a:srgbClr val="FFFF00"/>
-              </a:highlight>
-            </a:endParaRPr>
-          </a:p>
-          <a:p>
-            <a:pPr marL="461963" lvl="1" indent="-285750">
-              <a:spcBef>
-                <a:spcPts val="600"/>
-              </a:spcBef>
-              <a:buFont typeface="Arial" panose="020B0604020202020204" pitchFamily="34" charset="0"/>
-              <a:buChar char="•"/>
-            </a:pPr>
-            <a:r>
-              <a:rPr lang="de-DE" dirty="0" err="1">
-                <a:highlight>
-                  <a:srgbClr val="FFFF00"/>
-                </a:highlight>
-              </a:rPr>
-              <a:t>Locality</a:t>
-            </a:r>
-            <a:r>
-              <a:rPr lang="de-DE" dirty="0">
-                <a:highlight>
-                  <a:srgbClr val="FFFF00"/>
-                </a:highlight>
-              </a:rPr>
-              <a:t> </a:t>
-            </a:r>
-            <a:r>
-              <a:rPr lang="de-DE" dirty="0" err="1">
-                <a:highlight>
-                  <a:srgbClr val="FFFF00"/>
-                </a:highlight>
-              </a:rPr>
-              <a:t>that</a:t>
-            </a:r>
-            <a:r>
-              <a:rPr lang="de-DE" dirty="0">
-                <a:highlight>
-                  <a:srgbClr val="FFFF00"/>
-                </a:highlight>
-              </a:rPr>
-              <a:t> </a:t>
-            </a:r>
-            <a:r>
-              <a:rPr lang="de-DE" dirty="0" err="1">
-                <a:highlight>
-                  <a:srgbClr val="FFFF00"/>
-                </a:highlight>
-              </a:rPr>
-              <a:t>is</a:t>
-            </a:r>
-            <a:r>
-              <a:rPr lang="de-DE" dirty="0">
-                <a:highlight>
-                  <a:srgbClr val="FFFF00"/>
-                </a:highlight>
-              </a:rPr>
-              <a:t> </a:t>
-            </a:r>
-            <a:r>
-              <a:rPr lang="de-DE" dirty="0" err="1">
-                <a:highlight>
-                  <a:srgbClr val="FFFF00"/>
-                </a:highlight>
-              </a:rPr>
-              <a:t>best</a:t>
-            </a:r>
-            <a:r>
-              <a:rPr lang="de-DE" dirty="0">
-                <a:highlight>
-                  <a:srgbClr val="FFFF00"/>
-                </a:highlight>
-              </a:rPr>
-              <a:t> </a:t>
-            </a:r>
-            <a:r>
-              <a:rPr lang="de-DE" dirty="0" err="1">
-                <a:highlight>
-                  <a:srgbClr val="FFFF00"/>
-                </a:highlight>
-              </a:rPr>
-              <a:t>described</a:t>
-            </a:r>
-            <a:r>
-              <a:rPr lang="de-DE" dirty="0">
-                <a:highlight>
-                  <a:srgbClr val="FFFF00"/>
-                </a:highlight>
-              </a:rPr>
-              <a:t> </a:t>
-            </a:r>
-            <a:r>
-              <a:rPr lang="de-DE" dirty="0" err="1">
-                <a:highlight>
-                  <a:srgbClr val="FFFF00"/>
-                </a:highlight>
-              </a:rPr>
-              <a:t>by</a:t>
-            </a:r>
-            <a:r>
-              <a:rPr lang="de-DE" dirty="0">
-                <a:highlight>
-                  <a:srgbClr val="FFFF00"/>
-                </a:highlight>
-              </a:rPr>
-              <a:t> </a:t>
-            </a:r>
-            <a:r>
-              <a:rPr lang="de-DE" dirty="0" err="1">
-                <a:highlight>
-                  <a:srgbClr val="FFFF00"/>
-                </a:highlight>
-              </a:rPr>
-              <a:t>capacity</a:t>
-            </a:r>
-            <a:r>
-              <a:rPr lang="de-DE" dirty="0">
-                <a:highlight>
-                  <a:srgbClr val="FFFF00"/>
-                </a:highlight>
-              </a:rPr>
-              <a:t> </a:t>
-            </a:r>
-            <a:r>
-              <a:rPr lang="de-DE" dirty="0" err="1">
-                <a:highlight>
-                  <a:srgbClr val="FFFF00"/>
-                </a:highlight>
-              </a:rPr>
-              <a:t>prices</a:t>
-            </a:r>
-            <a:r>
-              <a:rPr lang="de-DE" dirty="0">
-                <a:highlight>
-                  <a:srgbClr val="FFFF00"/>
-                </a:highlight>
-              </a:rPr>
-              <a:t>:</a:t>
-            </a:r>
-          </a:p>
-          <a:p>
-            <a:pPr marL="461963" lvl="1" indent="-285750">
-              <a:spcBef>
-                <a:spcPts val="600"/>
-              </a:spcBef>
-              <a:buFont typeface="Arial" panose="020B0604020202020204" pitchFamily="34" charset="0"/>
-              <a:buChar char="•"/>
-            </a:pPr>
-            <a:r>
-              <a:rPr lang="de-DE" dirty="0" err="1">
-                <a:highlight>
-                  <a:srgbClr val="FFFF00"/>
-                </a:highlight>
-              </a:rPr>
-              <a:t>Locality</a:t>
-            </a:r>
-            <a:r>
-              <a:rPr lang="de-DE" dirty="0">
-                <a:highlight>
-                  <a:srgbClr val="FFFF00"/>
-                </a:highlight>
-              </a:rPr>
-              <a:t> </a:t>
-            </a:r>
-            <a:r>
-              <a:rPr lang="de-DE" dirty="0" err="1">
-                <a:highlight>
-                  <a:srgbClr val="FFFF00"/>
-                </a:highlight>
-              </a:rPr>
-              <a:t>that</a:t>
-            </a:r>
-            <a:r>
-              <a:rPr lang="de-DE" dirty="0">
-                <a:highlight>
-                  <a:srgbClr val="FFFF00"/>
-                </a:highlight>
-              </a:rPr>
-              <a:t> </a:t>
-            </a:r>
-            <a:r>
-              <a:rPr lang="de-DE" dirty="0" err="1">
-                <a:highlight>
-                  <a:srgbClr val="FFFF00"/>
-                </a:highlight>
-              </a:rPr>
-              <a:t>is</a:t>
-            </a:r>
-            <a:r>
-              <a:rPr lang="de-DE" dirty="0">
-                <a:highlight>
-                  <a:srgbClr val="FFFF00"/>
-                </a:highlight>
-              </a:rPr>
-              <a:t> </a:t>
-            </a:r>
-            <a:r>
-              <a:rPr lang="de-DE" dirty="0" err="1">
-                <a:highlight>
-                  <a:srgbClr val="FFFF00"/>
-                </a:highlight>
-              </a:rPr>
-              <a:t>worst</a:t>
-            </a:r>
-            <a:r>
-              <a:rPr lang="de-DE" dirty="0">
-                <a:highlight>
-                  <a:srgbClr val="FFFF00"/>
-                </a:highlight>
-              </a:rPr>
-              <a:t> </a:t>
-            </a:r>
-            <a:r>
-              <a:rPr lang="de-DE" dirty="0" err="1">
-                <a:highlight>
-                  <a:srgbClr val="FFFF00"/>
-                </a:highlight>
-              </a:rPr>
-              <a:t>described</a:t>
-            </a:r>
-            <a:r>
-              <a:rPr lang="de-DE" dirty="0">
-                <a:highlight>
-                  <a:srgbClr val="FFFF00"/>
-                </a:highlight>
-              </a:rPr>
-              <a:t> </a:t>
-            </a:r>
-            <a:r>
-              <a:rPr lang="de-DE" dirty="0" err="1">
-                <a:highlight>
-                  <a:srgbClr val="FFFF00"/>
-                </a:highlight>
-              </a:rPr>
-              <a:t>by</a:t>
-            </a:r>
-            <a:r>
-              <a:rPr lang="de-DE" dirty="0">
-                <a:highlight>
-                  <a:srgbClr val="FFFF00"/>
-                </a:highlight>
-              </a:rPr>
-              <a:t> </a:t>
-            </a:r>
-            <a:r>
-              <a:rPr lang="de-DE" dirty="0" err="1">
-                <a:highlight>
-                  <a:srgbClr val="FFFF00"/>
-                </a:highlight>
-              </a:rPr>
-              <a:t>capacity</a:t>
-            </a:r>
-            <a:r>
-              <a:rPr lang="de-DE" dirty="0">
-                <a:highlight>
-                  <a:srgbClr val="FFFF00"/>
-                </a:highlight>
-              </a:rPr>
-              <a:t> </a:t>
-            </a:r>
-            <a:r>
-              <a:rPr lang="de-DE" dirty="0" err="1">
-                <a:highlight>
-                  <a:srgbClr val="FFFF00"/>
-                </a:highlight>
-              </a:rPr>
-              <a:t>prices</a:t>
-            </a:r>
-            <a:r>
-              <a:rPr lang="de-DE" dirty="0">
-                <a:highlight>
-                  <a:srgbClr val="FFFF00"/>
-                </a:highlight>
-              </a:rPr>
-              <a:t>:</a:t>
-            </a:r>
+              <a:rPr lang="de-DE" dirty="0" err="1"/>
+              <a:t>Multicollinearity</a:t>
+            </a:r>
+            <a:endParaRPr lang="de-DE" dirty="0"/>
           </a:p>
           <a:p>
             <a:pPr marL="285750" indent="-285750">
@@ -15282,64 +15204,6 @@
               <a:buChar char="-"/>
             </a:pPr>
             <a:r>
-              <a:rPr lang="de-DE" dirty="0">
-                <a:highlight>
-                  <a:srgbClr val="FFFF00"/>
-                </a:highlight>
-              </a:rPr>
-              <a:t>??</a:t>
-            </a:r>
-          </a:p>
-          <a:p>
-            <a:pPr>
-              <a:spcBef>
-                <a:spcPts val="600"/>
-              </a:spcBef>
-            </a:pPr>
-            <a:endParaRPr lang="de-DE" dirty="0"/>
-          </a:p>
-          <a:p>
-            <a:pPr>
-              <a:spcBef>
-                <a:spcPts val="600"/>
-              </a:spcBef>
-            </a:pPr>
-            <a:r>
-              <a:rPr lang="de-DE" b="1" dirty="0"/>
-              <a:t>Statistical </a:t>
-            </a:r>
-            <a:r>
-              <a:rPr lang="de-DE" b="1" dirty="0" err="1"/>
-              <a:t>problems</a:t>
-            </a:r>
-            <a:r>
-              <a:rPr lang="de-DE" b="1" dirty="0"/>
-              <a:t>:</a:t>
-            </a:r>
-          </a:p>
-          <a:p>
-            <a:pPr marL="285750" indent="-285750">
-              <a:spcBef>
-                <a:spcPts val="600"/>
-              </a:spcBef>
-              <a:buFontTx/>
-              <a:buChar char="-"/>
-            </a:pPr>
-            <a:r>
-              <a:rPr lang="de-DE" dirty="0" err="1"/>
-              <a:t>Multicollinearity</a:t>
-            </a:r>
-            <a:endParaRPr lang="de-DE" dirty="0"/>
-          </a:p>
-          <a:p>
-            <a:pPr marL="285750" indent="-285750">
-              <a:spcBef>
-                <a:spcPts val="600"/>
-              </a:spcBef>
-              <a:buFontTx/>
-              <a:buChar char="-"/>
-            </a:pPr>
-            <a:r>
               <a:rPr lang="de-DE" dirty="0" err="1"/>
               <a:t>Stationarity</a:t>
             </a:r>
@@ -15354,52 +15218,6 @@
             <a:r>
               <a:rPr lang="de-DE" dirty="0"/>
               <a:t>)</a:t>
-            </a:r>
-          </a:p>
-          <a:p>
-            <a:pPr marL="285750" indent="-285750">
-              <a:spcBef>
-                <a:spcPts val="600"/>
-              </a:spcBef>
-              <a:buFontTx/>
-              <a:buChar char="-"/>
-            </a:pPr>
-            <a:r>
-              <a:rPr lang="de-DE" dirty="0"/>
-              <a:t>Right time lags? (</a:t>
-            </a:r>
-            <a:r>
-              <a:rPr lang="de-DE" dirty="0" err="1"/>
-              <a:t>investors</a:t>
-            </a:r>
-            <a:r>
-              <a:rPr lang="de-DE" dirty="0"/>
-              <a:t>‘ </a:t>
-            </a:r>
-            <a:r>
-              <a:rPr lang="de-DE" dirty="0" err="1"/>
-              <a:t>hesitatement</a:t>
-            </a:r>
-            <a:r>
-              <a:rPr lang="de-DE" dirty="0"/>
-              <a:t>)</a:t>
-            </a:r>
-          </a:p>
-          <a:p>
-            <a:pPr marL="285750" indent="-285750">
-              <a:spcBef>
-                <a:spcPts val="600"/>
-              </a:spcBef>
-              <a:buFontTx/>
-              <a:buChar char="-"/>
-            </a:pPr>
-            <a:r>
-              <a:rPr lang="de-DE" dirty="0" err="1"/>
-              <a:t>Omitted</a:t>
-            </a:r>
-            <a:r>
-              <a:rPr lang="de-DE" dirty="0"/>
-              <a:t> variables</a:t>
             </a:r>
           </a:p>
           <a:p>
@@ -15534,7 +15352,7 @@
         </p:blipFill>
         <p:spPr>
           <a:xfrm>
-            <a:off x="355090" y="3839225"/>
+            <a:off x="355090" y="5262308"/>
             <a:ext cx="324000" cy="324000"/>
           </a:xfrm>
           <a:prstGeom prst="rect">
@@ -15570,7 +15388,7 @@
         </p:blipFill>
         <p:spPr>
           <a:xfrm>
-            <a:off x="319090" y="1713028"/>
+            <a:off x="319090" y="1693364"/>
             <a:ext cx="396000" cy="396000"/>
           </a:xfrm>
           <a:prstGeom prst="rect">
@@ -15578,6 +15396,215 @@
           </a:prstGeom>
         </p:spPr>
       </p:pic>
+      <p:sp>
+        <p:nvSpPr>
+          <p:cNvPr id="7" name="Textfeld 6">
+            <a:extLst>
+              <a:ext uri="{FF2B5EF4-FFF2-40B4-BE49-F238E27FC236}">
+                <a16:creationId xmlns:a16="http://schemas.microsoft.com/office/drawing/2014/main" id="{DDCF5E0E-BD92-4481-A407-FB110B566748}"/>
+              </a:ext>
+            </a:extLst>
+          </p:cNvPr>
+          <p:cNvSpPr txBox="1"/>
+          <p:nvPr/>
+        </p:nvSpPr>
+        <p:spPr>
+          <a:xfrm>
+            <a:off x="4237702" y="5664964"/>
+            <a:ext cx="4227871" cy="826637"/>
+          </a:xfrm>
+          <a:prstGeom prst="rect">
+            <a:avLst/>
+          </a:prstGeom>
+          <a:noFill/>
+        </p:spPr>
+        <p:txBody>
+          <a:bodyPr wrap="square" lIns="0" tIns="0" rIns="0" bIns="0" rtlCol="0">
+            <a:spAutoFit/>
+          </a:bodyPr>
+          <a:lstStyle/>
+          <a:p>
+            <a:pPr marL="285750" indent="-285750">
+              <a:spcBef>
+                <a:spcPts val="600"/>
+              </a:spcBef>
+              <a:buFontTx/>
+              <a:buChar char="-"/>
+            </a:pPr>
+            <a:r>
+              <a:rPr lang="de-DE" sz="1600" dirty="0"/>
+              <a:t>Right time lags? (</a:t>
+            </a:r>
+            <a:r>
+              <a:rPr lang="de-DE" sz="1600" dirty="0" err="1"/>
+              <a:t>investors</a:t>
+            </a:r>
+            <a:r>
+              <a:rPr lang="de-DE" sz="1600" dirty="0"/>
+              <a:t>‘ </a:t>
+            </a:r>
+            <a:r>
+              <a:rPr lang="de-DE" sz="1600" dirty="0" err="1"/>
+              <a:t>hesitation</a:t>
+            </a:r>
+            <a:r>
+              <a:rPr lang="de-DE" sz="1600" dirty="0"/>
+              <a:t>)</a:t>
+            </a:r>
+          </a:p>
+          <a:p>
+            <a:pPr marL="285750" indent="-285750">
+              <a:spcBef>
+                <a:spcPts val="600"/>
+              </a:spcBef>
+              <a:buFontTx/>
+              <a:buChar char="-"/>
+            </a:pPr>
+            <a:r>
+              <a:rPr lang="de-DE" sz="1600" dirty="0" err="1"/>
+              <a:t>Omitted</a:t>
+            </a:r>
+            <a:r>
+              <a:rPr lang="de-DE" sz="1600" dirty="0"/>
+              <a:t> variables</a:t>
+            </a:r>
+          </a:p>
+          <a:p>
+            <a:pPr>
+              <a:lnSpc>
+                <a:spcPct val="114000"/>
+              </a:lnSpc>
+            </a:pPr>
+            <a:endParaRPr lang="en-GB" sz="1600" dirty="0" err="1">
+              <a:latin typeface="+mn-lt"/>
+            </a:endParaRPr>
+          </a:p>
+        </p:txBody>
+      </p:sp>
+      <p:sp>
+        <p:nvSpPr>
+          <p:cNvPr id="8" name="Rechteck 7">
+            <a:extLst>
+              <a:ext uri="{FF2B5EF4-FFF2-40B4-BE49-F238E27FC236}">
+                <a16:creationId xmlns:a16="http://schemas.microsoft.com/office/drawing/2014/main" id="{A7A1F708-BB18-44DE-AD8C-44AFB39DA3E1}"/>
+              </a:ext>
+            </a:extLst>
+          </p:cNvPr>
+          <p:cNvSpPr/>
+          <p:nvPr/>
+        </p:nvSpPr>
+        <p:spPr>
+          <a:xfrm>
+            <a:off x="715090" y="2497394"/>
+            <a:ext cx="3522612" cy="1995948"/>
+          </a:xfrm>
+          <a:prstGeom prst="rect">
+            <a:avLst/>
+          </a:prstGeom>
+          <a:ln>
+            <a:noFill/>
+          </a:ln>
+        </p:spPr>
+        <p:style>
+          <a:lnRef idx="2">
+            <a:schemeClr val="accent1">
+              <a:shade val="50000"/>
+            </a:schemeClr>
+          </a:lnRef>
+          <a:fillRef idx="1">
+            <a:schemeClr val="accent1"/>
+          </a:fillRef>
+          <a:effectRef idx="0">
+            <a:schemeClr val="accent1"/>
+          </a:effectRef>
+          <a:fontRef idx="minor">
+            <a:schemeClr val="lt1"/>
+          </a:fontRef>
+        </p:style>
+        <p:txBody>
+          <a:bodyPr rot="0" spcFirstLastPara="0" vertOverflow="overflow" horzOverflow="overflow" vert="horz" wrap="square" lIns="91440" tIns="45720" rIns="91440" bIns="45720" numCol="1" spcCol="0" rtlCol="0" fromWordArt="0" anchor="t" anchorCtr="0" forceAA="0" compatLnSpc="1">
+            <a:prstTxWarp prst="textNoShape">
+              <a:avLst/>
+            </a:prstTxWarp>
+            <a:noAutofit/>
+          </a:bodyPr>
+          <a:lstStyle/>
+          <a:p>
+            <a:pPr algn="ctr">
+              <a:lnSpc>
+                <a:spcPct val="114000"/>
+              </a:lnSpc>
+            </a:pPr>
+            <a:r>
+              <a:rPr lang="de-DE" dirty="0"/>
+              <a:t>ICAP</a:t>
+            </a:r>
+            <a:endParaRPr lang="en-GB" dirty="0"/>
+          </a:p>
+        </p:txBody>
+      </p:sp>
+      <p:sp>
+        <p:nvSpPr>
+          <p:cNvPr id="12" name="Rechteck 11">
+            <a:extLst>
+              <a:ext uri="{FF2B5EF4-FFF2-40B4-BE49-F238E27FC236}">
+                <a16:creationId xmlns:a16="http://schemas.microsoft.com/office/drawing/2014/main" id="{D988DA57-60E8-47B6-84D6-CE75FD148755}"/>
+              </a:ext>
+            </a:extLst>
+          </p:cNvPr>
+          <p:cNvSpPr/>
+          <p:nvPr/>
+        </p:nvSpPr>
+        <p:spPr>
+          <a:xfrm>
+            <a:off x="4662742" y="2465872"/>
+            <a:ext cx="3522612" cy="1995948"/>
+          </a:xfrm>
+          <a:prstGeom prst="rect">
+            <a:avLst/>
+          </a:prstGeom>
+          <a:ln>
+            <a:noFill/>
+          </a:ln>
+        </p:spPr>
+        <p:style>
+          <a:lnRef idx="2">
+            <a:schemeClr val="accent1">
+              <a:shade val="50000"/>
+            </a:schemeClr>
+          </a:lnRef>
+          <a:fillRef idx="1">
+            <a:schemeClr val="accent1"/>
+          </a:fillRef>
+          <a:effectRef idx="0">
+            <a:schemeClr val="accent1"/>
+          </a:effectRef>
+          <a:fontRef idx="minor">
+            <a:schemeClr val="lt1"/>
+          </a:fontRef>
+        </p:style>
+        <p:txBody>
+          <a:bodyPr rot="0" spcFirstLastPara="0" vertOverflow="overflow" horzOverflow="overflow" vert="horz" wrap="square" lIns="91440" tIns="45720" rIns="91440" bIns="45720" numCol="1" spcCol="0" rtlCol="0" fromWordArt="0" anchor="t" anchorCtr="0" forceAA="0" compatLnSpc="1">
+            <a:prstTxWarp prst="textNoShape">
+              <a:avLst/>
+            </a:prstTxWarp>
+            <a:noAutofit/>
+          </a:bodyPr>
+          <a:lstStyle/>
+          <a:p>
+            <a:pPr algn="ctr">
+              <a:lnSpc>
+                <a:spcPct val="114000"/>
+              </a:lnSpc>
+            </a:pPr>
+            <a:r>
+              <a:rPr lang="de-DE" dirty="0" err="1"/>
+              <a:t>Oversupply</a:t>
+            </a:r>
+            <a:endParaRPr lang="en-GB" dirty="0"/>
+          </a:p>
+        </p:txBody>
+      </p:sp>
     </p:spTree>
     <p:extLst>
       <p:ext uri="{BB962C8B-B14F-4D97-AF65-F5344CB8AC3E}">
@@ -15640,114 +15667,82 @@
               </a:spcBef>
             </a:pPr>
             <a:r>
-              <a:rPr lang="de-DE" dirty="0" err="1">
-                <a:highlight>
-                  <a:srgbClr val="FFFF00"/>
-                </a:highlight>
-              </a:rPr>
+              <a:rPr lang="de-DE" dirty="0" err="1"/>
               <a:t>Installed</a:t>
             </a:r>
             <a:r>
-              <a:rPr lang="de-DE" dirty="0">
-                <a:highlight>
-                  <a:srgbClr val="FFFF00"/>
-                </a:highlight>
-              </a:rPr>
+              <a:rPr lang="de-DE" dirty="0"/>
               <a:t> </a:t>
             </a:r>
             <a:r>
-              <a:rPr lang="de-DE" dirty="0" err="1">
-                <a:highlight>
-                  <a:srgbClr val="FFFF00"/>
-                </a:highlight>
-              </a:rPr>
+              <a:rPr lang="de-DE" dirty="0" err="1"/>
               <a:t>capacity</a:t>
             </a:r>
             <a:r>
-              <a:rPr lang="de-DE" dirty="0">
-                <a:highlight>
-                  <a:srgbClr val="FFFF00"/>
-                </a:highlight>
-              </a:rPr>
+              <a:rPr lang="de-DE" dirty="0"/>
               <a:t> </a:t>
             </a:r>
             <a:r>
-              <a:rPr lang="de-DE" dirty="0" err="1">
-                <a:highlight>
-                  <a:srgbClr val="FFFF00"/>
-                </a:highlight>
-              </a:rPr>
+              <a:rPr lang="de-DE" dirty="0" err="1"/>
               <a:t>is</a:t>
             </a:r>
             <a:r>
-              <a:rPr lang="de-DE" dirty="0">
-                <a:highlight>
-                  <a:srgbClr val="FFFF00"/>
-                </a:highlight>
-              </a:rPr>
-              <a:t> (not) </a:t>
-            </a:r>
-            <a:r>
-              <a:rPr lang="de-DE" dirty="0" err="1">
-                <a:highlight>
-                  <a:srgbClr val="FFFF00"/>
-                </a:highlight>
-              </a:rPr>
+              <a:rPr lang="de-DE" dirty="0"/>
+              <a:t> not </a:t>
+            </a:r>
+            <a:r>
+              <a:rPr lang="de-DE" dirty="0" err="1"/>
               <a:t>driven</a:t>
             </a:r>
             <a:r>
-              <a:rPr lang="de-DE" dirty="0">
-                <a:highlight>
-                  <a:srgbClr val="FFFF00"/>
-                </a:highlight>
-              </a:rPr>
+              <a:rPr lang="de-DE" dirty="0"/>
               <a:t> </a:t>
             </a:r>
             <a:r>
-              <a:rPr lang="de-DE" dirty="0" err="1">
-                <a:highlight>
-                  <a:srgbClr val="FFFF00"/>
-                </a:highlight>
-              </a:rPr>
+              <a:rPr lang="de-DE" dirty="0" err="1"/>
               <a:t>by</a:t>
             </a:r>
             <a:r>
-              <a:rPr lang="de-DE" dirty="0">
-                <a:highlight>
-                  <a:srgbClr val="FFFF00"/>
-                </a:highlight>
-              </a:rPr>
+              <a:rPr lang="de-DE" dirty="0"/>
               <a:t> </a:t>
             </a:r>
             <a:r>
-              <a:rPr lang="de-DE" dirty="0" err="1">
-                <a:highlight>
-                  <a:srgbClr val="FFFF00"/>
-                </a:highlight>
-              </a:rPr>
+              <a:rPr lang="de-DE" dirty="0" err="1"/>
               <a:t>capacity</a:t>
             </a:r>
             <a:r>
-              <a:rPr lang="de-DE" dirty="0">
-                <a:highlight>
-                  <a:srgbClr val="FFFF00"/>
-                </a:highlight>
-              </a:rPr>
+              <a:rPr lang="de-DE" dirty="0"/>
               <a:t> </a:t>
             </a:r>
             <a:r>
-              <a:rPr lang="de-DE" dirty="0" err="1">
-                <a:highlight>
-                  <a:srgbClr val="FFFF00"/>
-                </a:highlight>
-              </a:rPr>
+              <a:rPr lang="de-DE" dirty="0" err="1"/>
               <a:t>prices</a:t>
             </a:r>
-            <a:endParaRPr lang="de-DE" dirty="0">
-              <a:highlight>
-                <a:srgbClr val="FFFF00"/>
-              </a:highlight>
-            </a:endParaRPr>
+            <a:r>
+              <a:rPr lang="de-DE" dirty="0"/>
+              <a:t> acc. </a:t>
+            </a:r>
+            <a:r>
+              <a:rPr lang="de-DE" dirty="0" err="1"/>
+              <a:t>to</a:t>
+            </a:r>
+            <a:r>
+              <a:rPr lang="de-DE" dirty="0"/>
+              <a:t> </a:t>
+            </a:r>
+            <a:r>
+              <a:rPr lang="de-DE" dirty="0" err="1"/>
+              <a:t>our</a:t>
+            </a:r>
+            <a:r>
+              <a:rPr lang="de-DE" dirty="0"/>
+              <a:t> </a:t>
+            </a:r>
+            <a:r>
+              <a:rPr lang="de-DE" dirty="0" err="1"/>
+              <a:t>model</a:t>
+            </a:r>
+            <a:endParaRPr lang="de-DE" dirty="0"/>
           </a:p>
           <a:p>
             <a:pPr defTabSz="360000">
@@ -15756,139 +15751,103 @@
               </a:spcBef>
             </a:pPr>
             <a:r>
+              <a:rPr lang="de-DE" dirty="0"/>
+              <a:t>	</a:t>
+            </a:r>
+            <a:r>
               <a:rPr lang="de-DE" dirty="0">
-                <a:highlight>
-                  <a:srgbClr val="FFFF00"/>
-                </a:highlight>
-              </a:rPr>
-              <a:t>	</a:t>
-            </a:r>
-            <a:r>
-              <a:rPr lang="de-DE" dirty="0">
-                <a:highlight>
-                  <a:srgbClr val="FFFF00"/>
-                </a:highlight>
                 <a:sym typeface="Wingdings" panose="05000000000000000000" pitchFamily="2" charset="2"/>
               </a:rPr>
               <a:t> </a:t>
             </a:r>
             <a:r>
-              <a:rPr lang="de-DE" dirty="0">
-                <a:highlight>
-                  <a:srgbClr val="FFFF00"/>
-                </a:highlight>
-              </a:rPr>
-              <a:t>Main </a:t>
-            </a:r>
-            <a:r>
-              <a:rPr lang="de-DE" dirty="0" err="1">
-                <a:highlight>
-                  <a:srgbClr val="FFFF00"/>
-                </a:highlight>
-              </a:rPr>
-              <a:t>driver</a:t>
-            </a:r>
-            <a:r>
-              <a:rPr lang="de-DE" dirty="0">
-                <a:highlight>
-                  <a:srgbClr val="FFFF00"/>
-                </a:highlight>
-              </a:rPr>
+              <a:rPr lang="de-DE" dirty="0"/>
+              <a:t>Model </a:t>
+            </a:r>
+            <a:r>
+              <a:rPr lang="de-DE" dirty="0" err="1"/>
+              <a:t>shows</a:t>
+            </a:r>
+            <a:r>
+              <a:rPr lang="de-DE" dirty="0"/>
+              <a:t> fundamental </a:t>
+            </a:r>
+            <a:r>
+              <a:rPr lang="de-DE" dirty="0" err="1"/>
+              <a:t>correlation</a:t>
+            </a:r>
+            <a:r>
+              <a:rPr lang="de-DE" dirty="0"/>
               <a:t> </a:t>
             </a:r>
             <a:r>
-              <a:rPr lang="de-DE" dirty="0" err="1">
-                <a:highlight>
-                  <a:srgbClr val="FFFF00"/>
-                </a:highlight>
-              </a:rPr>
-              <a:t>according</a:t>
-            </a:r>
-            <a:r>
-              <a:rPr lang="de-DE" dirty="0">
-                <a:highlight>
-                  <a:srgbClr val="FFFF00"/>
-                </a:highlight>
-              </a:rPr>
+              <a:rPr lang="de-DE" dirty="0" err="1"/>
+              <a:t>between</a:t>
+            </a:r>
+            <a:r>
+              <a:rPr lang="de-DE" dirty="0"/>
               <a:t> </a:t>
             </a:r>
             <a:r>
-              <a:rPr lang="de-DE" dirty="0" err="1">
-                <a:highlight>
-                  <a:srgbClr val="FFFF00"/>
-                </a:highlight>
-              </a:rPr>
-              <a:t>to</a:t>
-            </a:r>
-            <a:r>
-              <a:rPr lang="de-DE" dirty="0">
-                <a:highlight>
-                  <a:srgbClr val="FFFF00"/>
-                </a:highlight>
-              </a:rPr>
+              <a:rPr lang="de-DE" dirty="0" err="1"/>
+              <a:t>price</a:t>
+            </a:r>
+            <a:r>
+              <a:rPr lang="de-DE" dirty="0"/>
+              <a:t> and </a:t>
+            </a:r>
+            <a:r>
+              <a:rPr lang="de-DE" dirty="0" err="1"/>
+              <a:t>installed</a:t>
+            </a:r>
+            <a:r>
+              <a:rPr lang="de-DE" dirty="0"/>
               <a:t> </a:t>
             </a:r>
             <a:r>
-              <a:rPr lang="de-DE" dirty="0" err="1">
-                <a:highlight>
-                  <a:srgbClr val="FFFF00"/>
-                </a:highlight>
-              </a:rPr>
-              <a:t>model</a:t>
-            </a:r>
-            <a:r>
-              <a:rPr lang="de-DE" dirty="0">
-                <a:highlight>
-                  <a:srgbClr val="FFFF00"/>
-                </a:highlight>
-              </a:rPr>
+              <a:rPr lang="de-DE" dirty="0" err="1"/>
+              <a:t>capacity</a:t>
+            </a:r>
+            <a:r>
+              <a:rPr lang="de-DE" dirty="0"/>
+              <a:t> – </a:t>
+            </a:r>
+            <a:br>
+              <a:rPr lang="de-DE" dirty="0"/>
+            </a:br>
+            <a:r>
+              <a:rPr lang="de-DE" dirty="0"/>
+              <a:t>		</a:t>
+            </a:r>
+            <a:r>
+              <a:rPr lang="de-DE" dirty="0" err="1"/>
+              <a:t>rather</a:t>
+            </a:r>
+            <a:r>
+              <a:rPr lang="de-DE" dirty="0"/>
               <a:t> </a:t>
             </a:r>
             <a:r>
-              <a:rPr lang="de-DE" dirty="0" err="1">
-                <a:highlight>
-                  <a:srgbClr val="FFFF00"/>
-                </a:highlight>
-              </a:rPr>
-              <a:t>is</a:t>
-            </a:r>
-            <a:r>
-              <a:rPr lang="de-DE" dirty="0">
-                <a:highlight>
-                  <a:srgbClr val="FFFF00"/>
-                </a:highlight>
-              </a:rPr>
+              <a:rPr lang="de-DE" dirty="0" err="1"/>
+              <a:t>than</a:t>
+            </a:r>
+            <a:r>
+              <a:rPr lang="de-DE" dirty="0"/>
               <a:t> </a:t>
             </a:r>
             <a:r>
-              <a:rPr lang="de-DE" dirty="0" err="1">
-                <a:highlight>
-                  <a:srgbClr val="FFFF00"/>
-                </a:highlight>
-              </a:rPr>
-              <a:t>xy</a:t>
-            </a:r>
-            <a:r>
-              <a:rPr lang="de-DE" dirty="0">
-                <a:highlight>
-                  <a:srgbClr val="FFFF00"/>
-                </a:highlight>
-              </a:rPr>
-              <a:t> / Other </a:t>
-            </a:r>
-            <a:r>
-              <a:rPr lang="de-DE" dirty="0" err="1">
-                <a:highlight>
-                  <a:srgbClr val="FFFF00"/>
-                </a:highlight>
-              </a:rPr>
-              <a:t>drivers</a:t>
-            </a:r>
-            <a:endParaRPr lang="de-DE" dirty="0">
-              <a:highlight>
-                <a:srgbClr val="FFFF00"/>
-              </a:highlight>
-            </a:endParaRPr>
+              <a:rPr lang="de-DE" dirty="0" err="1"/>
+              <a:t>capacity</a:t>
+            </a:r>
+            <a:r>
+              <a:rPr lang="de-DE" dirty="0"/>
+              <a:t> </a:t>
+            </a:r>
+            <a:r>
+              <a:rPr lang="de-DE" dirty="0" err="1"/>
+              <a:t>expansion</a:t>
+            </a:r>
+            <a:endParaRPr lang="de-DE" dirty="0"/>
           </a:p>
           <a:p>
             <a:pPr defTabSz="360000">
@@ -16076,7 +16035,7 @@
             </a:r>
             <a:r>
               <a:rPr lang="de-DE" dirty="0" err="1"/>
-              <a:t>How</a:t>
+              <a:t>ensure</a:t>
             </a:r>
             <a:r>
               <a:rPr lang="de-DE" dirty="0"/>
@@ -16084,7 +16043,7 @@
             </a:r>
             <a:r>
               <a:rPr lang="de-DE" dirty="0" err="1"/>
-              <a:t>to</a:t>
+              <a:t>sufficient</a:t>
             </a:r>
             <a:r>
               <a:rPr lang="de-DE" dirty="0"/>
@@ -16092,7 +16051,15 @@
             </a:r>
             <a:r>
               <a:rPr lang="de-DE" dirty="0" err="1"/>
-              <a:t>ensure</a:t>
+              <a:t>investment</a:t>
+            </a:r>
+            <a:r>
+              <a:rPr lang="de-DE" dirty="0"/>
+              <a:t> in </a:t>
+            </a:r>
+            <a:r>
+              <a:rPr lang="de-DE" dirty="0" err="1"/>
+              <a:t>generation</a:t>
             </a:r>
             <a:r>
               <a:rPr lang="de-DE" dirty="0"/>
@@ -16100,35 +16067,7 @@
             </a:r>
             <a:r>
               <a:rPr lang="de-DE" dirty="0" err="1"/>
-              <a:t>sufficient</a:t>
-            </a:r>
-            <a:r>
-              <a:rPr lang="de-DE" dirty="0"/>
-              <a:t> </a:t>
-            </a:r>
-            <a:r>
-              <a:rPr lang="de-DE" dirty="0" err="1"/>
-              <a:t>investment</a:t>
-            </a:r>
-            <a:r>
-              <a:rPr lang="de-DE" dirty="0"/>
-              <a:t> in </a:t>
-            </a:r>
-            <a:r>
-              <a:rPr lang="de-DE" dirty="0" err="1"/>
-              <a:t>generation</a:t>
-            </a:r>
-            <a:r>
-              <a:rPr lang="de-DE" dirty="0"/>
-              <a:t> </a:t>
-            </a:r>
-            <a:r>
-              <a:rPr lang="de-DE" dirty="0" err="1"/>
               <a:t>capacity</a:t>
-            </a:r>
-            <a:r>
-              <a:rPr lang="de-DE" dirty="0"/>
-              <a:t>?</a:t>
             </a:r>
             <a:r>
               <a:rPr lang="de-DE" dirty="0">
@@ -16553,7 +16492,7 @@
         </p:blipFill>
         <p:spPr>
           <a:xfrm>
-            <a:off x="376505" y="2587973"/>
+            <a:off x="376505" y="2851165"/>
             <a:ext cx="360000" cy="360000"/>
           </a:xfrm>
           <a:prstGeom prst="rect">
@@ -16589,7 +16528,7 @@
         </p:blipFill>
         <p:spPr>
           <a:xfrm>
-            <a:off x="412505" y="3324328"/>
+            <a:off x="412505" y="3589803"/>
             <a:ext cx="288000" cy="288000"/>
           </a:xfrm>
           <a:prstGeom prst="rect">
@@ -16625,7 +16564,7 @@
         </p:blipFill>
         <p:spPr>
           <a:xfrm>
-            <a:off x="376505" y="4092310"/>
+            <a:off x="376505" y="4357785"/>
             <a:ext cx="360000" cy="360000"/>
           </a:xfrm>
           <a:prstGeom prst="rect">
@@ -16683,7 +16622,7 @@
         </p:nvSpPr>
         <p:spPr>
           <a:xfrm>
-            <a:off x="634180" y="5760637"/>
+            <a:off x="634180" y="6026111"/>
             <a:ext cx="344129" cy="304377"/>
           </a:xfrm>
           <a:prstGeom prst="rightArrow">
@@ -23669,8 +23608,8 @@
           <a:chExt cx="0" cy="0"/>
         </a:xfrm>
       </p:grpSpPr>
-      <mc:AlternateContent xmlns:mc="http://schemas.openxmlformats.org/markup-compatibility/2006">
-        <mc:Choice xmlns:a14="http://schemas.microsoft.com/office/drawing/2010/main" Requires="a14">
+      <mc:AlternateContent xmlns:mc="http://schemas.openxmlformats.org/markup-compatibility/2006" xmlns:a14="http://schemas.microsoft.com/office/drawing/2010/main">
+        <mc:Choice Requires="a14">
           <p:sp>
             <p:nvSpPr>
               <p:cNvPr id="2" name="Inhaltsplatzhalter 1">
@@ -24035,7 +23974,7 @@
             </p:txBody>
           </p:sp>
         </mc:Choice>
-        <mc:Fallback>
+        <mc:Fallback xmlns="">
           <p:sp>
             <p:nvSpPr>
               <p:cNvPr id="2" name="Inhaltsplatzhalter 1">

</xml_diff>

<commit_message>
finished presentation, changed plots
</commit_message>
<xml_diff>
--- a/Final_Presentation_Borvendeg_Hantke.pptx
+++ b/Final_Presentation_Borvendeg_Hantke.pptx
@@ -10,10 +10,10 @@
     <p:sldMasterId id="2147483697" r:id="rId6"/>
   </p:sldMasterIdLst>
   <p:notesMasterIdLst>
-    <p:notesMasterId r:id="rId28"/>
+    <p:notesMasterId r:id="rId30"/>
   </p:notesMasterIdLst>
   <p:handoutMasterIdLst>
-    <p:handoutMasterId r:id="rId29"/>
+    <p:handoutMasterId r:id="rId31"/>
   </p:handoutMasterIdLst>
   <p:sldIdLst>
     <p:sldId id="355" r:id="rId7"/>
@@ -34,9 +34,11 @@
     <p:sldId id="394" r:id="rId22"/>
     <p:sldId id="383" r:id="rId23"/>
     <p:sldId id="373" r:id="rId24"/>
-    <p:sldId id="400" r:id="rId25"/>
-    <p:sldId id="396" r:id="rId26"/>
-    <p:sldId id="395" r:id="rId27"/>
+    <p:sldId id="402" r:id="rId25"/>
+    <p:sldId id="403" r:id="rId26"/>
+    <p:sldId id="400" r:id="rId27"/>
+    <p:sldId id="396" r:id="rId28"/>
+    <p:sldId id="395" r:id="rId29"/>
   </p:sldIdLst>
   <p:sldSz cx="9144000" cy="6858000" type="screen4x3"/>
   <p:notesSz cx="9925050" cy="6665913"/>
@@ -3227,7 +3229,7 @@
               <a:pPr>
                 <a:defRPr/>
               </a:pPr>
-              <a:t>19/06/2023</a:t>
+              <a:t>20/06/2023</a:t>
             </a:fld>
             <a:endParaRPr lang="en-GB"/>
           </a:p>
@@ -3320,7 +3322,7 @@
               <a:pPr>
                 <a:defRPr/>
               </a:pPr>
-              <a:t>‹Nr.›</a:t>
+              <a:t>‹#›</a:t>
             </a:fld>
             <a:endParaRPr lang="en-GB"/>
           </a:p>
@@ -3446,7 +3448,7 @@
               <a:pPr>
                 <a:defRPr/>
               </a:pPr>
-              <a:t>19/06/2023</a:t>
+              <a:t>20/06/2023</a:t>
             </a:fld>
             <a:endParaRPr lang="en-GB"/>
           </a:p>
@@ -3638,7 +3640,7 @@
               <a:pPr>
                 <a:defRPr/>
               </a:pPr>
-              <a:t>‹Nr.›</a:t>
+              <a:t>‹#›</a:t>
             </a:fld>
             <a:endParaRPr lang="en-GB"/>
           </a:p>
@@ -4121,7 +4123,7 @@
             <a:fld id="{CE58CB1E-F828-4F11-99E0-327109AF9DA4}" type="slidenum">
               <a:rPr lang="de-DE" smtClean="0"/>
               <a:pPr/>
-              <a:t>‹Nr.›</a:t>
+              <a:t>‹#›</a:t>
             </a:fld>
             <a:endParaRPr lang="de-DE"/>
           </a:p>
@@ -4372,7 +4374,7 @@
             <a:fld id="{CE58CB1E-F828-4F11-99E0-327109AF9DA4}" type="slidenum">
               <a:rPr lang="de-DE" smtClean="0"/>
               <a:pPr/>
-              <a:t>‹Nr.›</a:t>
+              <a:t>‹#›</a:t>
             </a:fld>
             <a:endParaRPr lang="de-DE"/>
           </a:p>
@@ -4717,7 +4719,7 @@
             <a:fld id="{CE58CB1E-F828-4F11-99E0-327109AF9DA4}" type="slidenum">
               <a:rPr lang="de-DE" smtClean="0"/>
               <a:pPr/>
-              <a:t>‹Nr.›</a:t>
+              <a:t>‹#›</a:t>
             </a:fld>
             <a:endParaRPr lang="de-DE"/>
           </a:p>
@@ -4948,7 +4950,7 @@
             <a:fld id="{CE58CB1E-F828-4F11-99E0-327109AF9DA4}" type="slidenum">
               <a:rPr lang="de-DE" smtClean="0"/>
               <a:pPr/>
-              <a:t>‹Nr.›</a:t>
+              <a:t>‹#›</a:t>
             </a:fld>
             <a:endParaRPr lang="de-DE"/>
           </a:p>
@@ -5184,7 +5186,7 @@
             <a:fld id="{CE58CB1E-F828-4F11-99E0-327109AF9DA4}" type="slidenum">
               <a:rPr lang="de-DE" smtClean="0"/>
               <a:pPr/>
-              <a:t>‹Nr.›</a:t>
+              <a:t>‹#›</a:t>
             </a:fld>
             <a:endParaRPr lang="de-DE"/>
           </a:p>
@@ -5537,7 +5539,7 @@
             <a:fld id="{CE58CB1E-F828-4F11-99E0-327109AF9DA4}" type="slidenum">
               <a:rPr lang="de-DE" smtClean="0"/>
               <a:pPr/>
-              <a:t>‹Nr.›</a:t>
+              <a:t>‹#›</a:t>
             </a:fld>
             <a:endParaRPr lang="de-DE"/>
           </a:p>
@@ -5745,7 +5747,7 @@
             <a:fld id="{CE58CB1E-F828-4F11-99E0-327109AF9DA4}" type="slidenum">
               <a:rPr lang="de-DE" smtClean="0"/>
               <a:pPr/>
-              <a:t>‹Nr.›</a:t>
+              <a:t>‹#›</a:t>
             </a:fld>
             <a:endParaRPr lang="de-DE"/>
           </a:p>
@@ -6093,7 +6095,7 @@
             <a:fld id="{CE58CB1E-F828-4F11-99E0-327109AF9DA4}" type="slidenum">
               <a:rPr lang="de-DE" smtClean="0"/>
               <a:pPr/>
-              <a:t>‹Nr.›</a:t>
+              <a:t>‹#›</a:t>
             </a:fld>
             <a:endParaRPr lang="de-DE"/>
           </a:p>
@@ -6398,7 +6400,7 @@
             <a:fld id="{CE58CB1E-F828-4F11-99E0-327109AF9DA4}" type="slidenum">
               <a:rPr lang="de-DE" smtClean="0"/>
               <a:pPr/>
-              <a:t>‹Nr.›</a:t>
+              <a:t>‹#›</a:t>
             </a:fld>
             <a:endParaRPr lang="de-DE"/>
           </a:p>
@@ -6585,7 +6587,7 @@
             <a:fld id="{CE58CB1E-F828-4F11-99E0-327109AF9DA4}" type="slidenum">
               <a:rPr lang="de-DE" smtClean="0"/>
               <a:pPr/>
-              <a:t>‹Nr.›</a:t>
+              <a:t>‹#›</a:t>
             </a:fld>
             <a:endParaRPr lang="de-DE"/>
           </a:p>
@@ -6784,7 +6786,7 @@
             <a:fld id="{CE58CB1E-F828-4F11-99E0-327109AF9DA4}" type="slidenum">
               <a:rPr lang="de-DE" smtClean="0"/>
               <a:pPr/>
-              <a:t>‹Nr.›</a:t>
+              <a:t>‹#›</a:t>
             </a:fld>
             <a:endParaRPr lang="de-DE"/>
           </a:p>
@@ -6985,7 +6987,7 @@
             <a:fld id="{CE58CB1E-F828-4F11-99E0-327109AF9DA4}" type="slidenum">
               <a:rPr lang="de-DE" smtClean="0"/>
               <a:pPr/>
-              <a:t>‹Nr.›</a:t>
+              <a:t>‹#›</a:t>
             </a:fld>
             <a:endParaRPr lang="de-DE"/>
           </a:p>
@@ -7078,7 +7080,7 @@
             <a:fld id="{CE58CB1E-F828-4F11-99E0-327109AF9DA4}" type="slidenum">
               <a:rPr lang="de-DE" smtClean="0"/>
               <a:pPr/>
-              <a:t>‹Nr.›</a:t>
+              <a:t>‹#›</a:t>
             </a:fld>
             <a:endParaRPr lang="de-DE"/>
           </a:p>
@@ -7361,7 +7363,7 @@
             <a:fld id="{CE58CB1E-F828-4F11-99E0-327109AF9DA4}" type="slidenum">
               <a:rPr lang="de-DE" smtClean="0"/>
               <a:pPr/>
-              <a:t>‹Nr.›</a:t>
+              <a:t>‹#›</a:t>
             </a:fld>
             <a:endParaRPr lang="de-DE"/>
           </a:p>
@@ -7560,7 +7562,7 @@
             <a:fld id="{CE58CB1E-F828-4F11-99E0-327109AF9DA4}" type="slidenum">
               <a:rPr lang="de-DE" smtClean="0"/>
               <a:pPr/>
-              <a:t>‹Nr.›</a:t>
+              <a:t>‹#›</a:t>
             </a:fld>
             <a:endParaRPr lang="de-DE"/>
           </a:p>
@@ -7736,7 +7738,7 @@
             <a:fld id="{CE58CB1E-F828-4F11-99E0-327109AF9DA4}" type="slidenum">
               <a:rPr lang="de-DE" smtClean="0"/>
               <a:pPr/>
-              <a:t>‹Nr.›</a:t>
+              <a:t>‹#›</a:t>
             </a:fld>
             <a:endParaRPr lang="de-DE"/>
           </a:p>
@@ -8105,7 +8107,7 @@
             <a:fld id="{CE58CB1E-F828-4F11-99E0-327109AF9DA4}" type="slidenum">
               <a:rPr lang="de-DE" smtClean="0"/>
               <a:pPr/>
-              <a:t>‹Nr.›</a:t>
+              <a:t>‹#›</a:t>
             </a:fld>
             <a:endParaRPr lang="de-DE"/>
           </a:p>
@@ -8304,7 +8306,7 @@
             <a:fld id="{CE58CB1E-F828-4F11-99E0-327109AF9DA4}" type="slidenum">
               <a:rPr lang="de-DE" smtClean="0"/>
               <a:pPr/>
-              <a:t>‹Nr.›</a:t>
+              <a:t>‹#›</a:t>
             </a:fld>
             <a:endParaRPr lang="de-DE"/>
           </a:p>
@@ -8528,7 +8530,7 @@
             <a:fld id="{CE58CB1E-F828-4F11-99E0-327109AF9DA4}" type="slidenum">
               <a:rPr lang="de-DE" smtClean="0"/>
               <a:pPr/>
-              <a:t>‹Nr.›</a:t>
+              <a:t>‹#›</a:t>
             </a:fld>
             <a:endParaRPr lang="de-DE"/>
           </a:p>
@@ -8715,7 +8717,7 @@
             <a:fld id="{CE58CB1E-F828-4F11-99E0-327109AF9DA4}" type="slidenum">
               <a:rPr lang="de-DE" smtClean="0"/>
               <a:pPr/>
-              <a:t>‹Nr.›</a:t>
+              <a:t>‹#›</a:t>
             </a:fld>
             <a:endParaRPr lang="de-DE"/>
           </a:p>
@@ -8954,7 +8956,7 @@
             <a:fld id="{CE58CB1E-F828-4F11-99E0-327109AF9DA4}" type="slidenum">
               <a:rPr lang="de-DE" smtClean="0"/>
               <a:pPr/>
-              <a:t>‹Nr.›</a:t>
+              <a:t>‹#›</a:t>
             </a:fld>
             <a:endParaRPr lang="de-DE"/>
           </a:p>
@@ -9431,7 +9433,7 @@
                   <a:spcPct val="114000"/>
                 </a:lnSpc>
               </a:pPr>
-              <a:t>‹Nr.›</a:t>
+              <a:t>‹#›</a:t>
             </a:fld>
             <a:endParaRPr lang="de-DE" sz="1200">
               <a:latin typeface="+mn-lt"/>
@@ -9523,7 +9525,7 @@
             <a:fld id="{CE58CB1E-F828-4F11-99E0-327109AF9DA4}" type="slidenum">
               <a:rPr lang="de-DE" noProof="0" smtClean="0"/>
               <a:pPr/>
-              <a:t>‹Nr.›</a:t>
+              <a:t>‹#›</a:t>
             </a:fld>
             <a:endParaRPr lang="de-DE" noProof="0"/>
           </a:p>
@@ -10037,7 +10039,7 @@
             <a:fld id="{CE58CB1E-F828-4F11-99E0-327109AF9DA4}" type="slidenum">
               <a:rPr lang="de-DE" smtClean="0"/>
               <a:pPr/>
-              <a:t>‹Nr.›</a:t>
+              <a:t>‹#›</a:t>
             </a:fld>
             <a:endParaRPr lang="de-DE"/>
           </a:p>
@@ -10713,7 +10715,7 @@
             <a:fld id="{CE58CB1E-F828-4F11-99E0-327109AF9DA4}" type="slidenum">
               <a:rPr lang="de-DE" smtClean="0"/>
               <a:pPr/>
-              <a:t>‹Nr.›</a:t>
+              <a:t>‹#›</a:t>
             </a:fld>
             <a:endParaRPr lang="de-DE"/>
           </a:p>
@@ -11338,7 +11340,7 @@
             <a:fld id="{CE58CB1E-F828-4F11-99E0-327109AF9DA4}" type="slidenum">
               <a:rPr lang="de-DE" smtClean="0"/>
               <a:pPr/>
-              <a:t>‹Nr.›</a:t>
+              <a:t>‹#›</a:t>
             </a:fld>
             <a:endParaRPr lang="de-DE"/>
           </a:p>
@@ -11935,7 +11937,7 @@
             <a:fld id="{CE58CB1E-F828-4F11-99E0-327109AF9DA4}" type="slidenum">
               <a:rPr lang="de-DE" smtClean="0"/>
               <a:pPr/>
-              <a:t>‹Nr.›</a:t>
+              <a:t>‹#›</a:t>
             </a:fld>
             <a:endParaRPr lang="de-DE"/>
           </a:p>
@@ -13808,77 +13810,6 @@
       </p:grpSpPr>
       <p:sp>
         <p:nvSpPr>
-          <p:cNvPr id="2" name="Inhaltsplatzhalter 1">
-            <a:extLst>
-              <a:ext uri="{FF2B5EF4-FFF2-40B4-BE49-F238E27FC236}">
-                <a16:creationId xmlns:a16="http://schemas.microsoft.com/office/drawing/2014/main" id="{26C01E87-7423-4DA4-88FA-23AAD9B3C566}"/>
-              </a:ext>
-            </a:extLst>
-          </p:cNvPr>
-          <p:cNvSpPr>
-            <a:spLocks noGrp="1"/>
-          </p:cNvSpPr>
-          <p:nvPr>
-            <p:ph idx="1"/>
-          </p:nvPr>
-        </p:nvSpPr>
-        <p:spPr/>
-        <p:txBody>
-          <a:bodyPr/>
-          <a:lstStyle/>
-          <a:p>
-            <a:r>
-              <a:rPr lang="de-DE" dirty="0">
-                <a:highlight>
-                  <a:srgbClr val="FFFF00"/>
-                </a:highlight>
-              </a:rPr>
-              <a:t>All </a:t>
-            </a:r>
-            <a:r>
-              <a:rPr lang="de-DE" dirty="0" err="1">
-                <a:highlight>
-                  <a:srgbClr val="FFFF00"/>
-                </a:highlight>
-              </a:rPr>
-              <a:t>parameters</a:t>
-            </a:r>
-            <a:r>
-              <a:rPr lang="de-DE" dirty="0">
-                <a:highlight>
-                  <a:srgbClr val="FFFF00"/>
-                </a:highlight>
-              </a:rPr>
-              <a:t> </a:t>
-            </a:r>
-            <a:r>
-              <a:rPr lang="de-DE" dirty="0">
-                <a:highlight>
-                  <a:srgbClr val="FFFF00"/>
-                </a:highlight>
-                <a:sym typeface="Wingdings" panose="05000000000000000000" pitchFamily="2" charset="2"/>
-              </a:rPr>
-              <a:t> </a:t>
-            </a:r>
-            <a:r>
-              <a:rPr lang="de-DE" dirty="0" err="1">
-                <a:highlight>
-                  <a:srgbClr val="FFFF00"/>
-                </a:highlight>
-                <a:sym typeface="Wingdings" panose="05000000000000000000" pitchFamily="2" charset="2"/>
-              </a:rPr>
-              <a:t>multicollinearity</a:t>
-            </a:r>
-            <a:endParaRPr lang="en-GB" dirty="0">
-              <a:highlight>
-                <a:srgbClr val="FFFF00"/>
-              </a:highlight>
-            </a:endParaRPr>
-          </a:p>
-        </p:txBody>
-      </p:sp>
-      <p:sp>
-        <p:nvSpPr>
           <p:cNvPr id="3" name="Foliennummernplatzhalter 2">
             <a:extLst>
               <a:ext uri="{FF2B5EF4-FFF2-40B4-BE49-F238E27FC236}">
@@ -13958,12 +13889,20 @@
           <a:lstStyle/>
           <a:p>
             <a:r>
-              <a:rPr lang="de-DE" sz="2000" dirty="0">
+              <a:rPr lang="hu-HU" sz="2000" dirty="0" err="1">
                 <a:solidFill>
                   <a:srgbClr val="0065BD"/>
                 </a:solidFill>
               </a:rPr>
-              <a:t>First Model</a:t>
+              <a:t>Model</a:t>
+            </a:r>
+            <a:r>
+              <a:rPr lang="hu-HU" sz="2000" dirty="0">
+                <a:solidFill>
+                  <a:srgbClr val="0065BD"/>
+                </a:solidFill>
+              </a:rPr>
+              <a:t> A</a:t>
             </a:r>
             <a:endParaRPr lang="en-GB" sz="2000" dirty="0">
               <a:solidFill>
@@ -14014,6 +13953,302 @@
           </a:p>
         </p:txBody>
       </p:sp>
+      <p:sp>
+        <p:nvSpPr>
+          <p:cNvPr id="11" name="Inhaltsplatzhalter 1">
+            <a:extLst>
+              <a:ext uri="{FF2B5EF4-FFF2-40B4-BE49-F238E27FC236}">
+                <a16:creationId xmlns:a16="http://schemas.microsoft.com/office/drawing/2014/main" id="{63D1EBC7-C1B0-4468-C9E6-D7AD5D7CFBA3}"/>
+              </a:ext>
+            </a:extLst>
+          </p:cNvPr>
+          <p:cNvSpPr>
+            <a:spLocks noGrp="1"/>
+          </p:cNvSpPr>
+          <p:nvPr>
+            <p:ph idx="1"/>
+          </p:nvPr>
+        </p:nvSpPr>
+        <p:spPr>
+          <a:xfrm>
+            <a:off x="319089" y="2510913"/>
+            <a:ext cx="3224213" cy="3671226"/>
+          </a:xfrm>
+        </p:spPr>
+        <p:txBody>
+          <a:bodyPr/>
+          <a:lstStyle/>
+          <a:p>
+            <a:r>
+              <a:rPr lang="hu-HU" b="1" dirty="0" err="1"/>
+              <a:t>Results</a:t>
+            </a:r>
+            <a:r>
+              <a:rPr lang="hu-HU" b="1" dirty="0"/>
+              <a:t>:</a:t>
+            </a:r>
+          </a:p>
+          <a:p>
+            <a:pPr marL="285750" indent="-285750">
+              <a:buFont typeface="Arial" panose="020B0604020202020204" pitchFamily="34" charset="0"/>
+              <a:buChar char="•"/>
+            </a:pPr>
+            <a:r>
+              <a:rPr lang="hu-HU" dirty="0"/>
+              <a:t>4-year-lagged </a:t>
+            </a:r>
+            <a:r>
+              <a:rPr lang="hu-HU" dirty="0" err="1"/>
+              <a:t>capacity</a:t>
+            </a:r>
+            <a:r>
+              <a:rPr lang="hu-HU" dirty="0"/>
+              <a:t> </a:t>
+            </a:r>
+            <a:r>
+              <a:rPr lang="hu-HU" dirty="0" err="1"/>
+              <a:t>prices</a:t>
+            </a:r>
+            <a:r>
+              <a:rPr lang="hu-HU" dirty="0"/>
+              <a:t> </a:t>
+            </a:r>
+            <a:r>
+              <a:rPr lang="hu-HU" dirty="0" err="1"/>
+              <a:t>are</a:t>
+            </a:r>
+            <a:r>
+              <a:rPr lang="hu-HU" dirty="0"/>
+              <a:t> </a:t>
+            </a:r>
+            <a:r>
+              <a:rPr lang="hu-HU" dirty="0" err="1"/>
+              <a:t>significant</a:t>
+            </a:r>
+            <a:r>
+              <a:rPr lang="hu-HU" dirty="0"/>
+              <a:t> </a:t>
+            </a:r>
+            <a:r>
+              <a:rPr lang="hu-HU" dirty="0" err="1"/>
+              <a:t>with</a:t>
+            </a:r>
+            <a:r>
+              <a:rPr lang="hu-HU" dirty="0"/>
+              <a:t> </a:t>
+            </a:r>
+            <a:r>
+              <a:rPr lang="hu-HU" dirty="0" err="1"/>
+              <a:t>positive</a:t>
+            </a:r>
+            <a:r>
+              <a:rPr lang="hu-HU" dirty="0"/>
+              <a:t> </a:t>
+            </a:r>
+            <a:r>
+              <a:rPr lang="hu-HU" dirty="0" err="1"/>
+              <a:t>coefficient</a:t>
+            </a:r>
+            <a:endParaRPr lang="hu-HU" dirty="0"/>
+          </a:p>
+          <a:p>
+            <a:pPr marL="285750" indent="-285750">
+              <a:buFont typeface="Arial" panose="020B0604020202020204" pitchFamily="34" charset="0"/>
+              <a:buChar char="•"/>
+            </a:pPr>
+            <a:r>
+              <a:rPr lang="hu-HU" dirty="0"/>
+              <a:t>3- and 4-year-lagged </a:t>
+            </a:r>
+            <a:r>
+              <a:rPr lang="hu-HU" dirty="0" err="1"/>
+              <a:t>day-ahead</a:t>
+            </a:r>
+            <a:r>
+              <a:rPr lang="hu-HU" dirty="0"/>
+              <a:t> </a:t>
+            </a:r>
+            <a:r>
+              <a:rPr lang="hu-HU" dirty="0" err="1"/>
+              <a:t>prices</a:t>
+            </a:r>
+            <a:r>
+              <a:rPr lang="hu-HU" dirty="0"/>
+              <a:t> </a:t>
+            </a:r>
+            <a:r>
+              <a:rPr lang="hu-HU" dirty="0" err="1"/>
+              <a:t>are</a:t>
+            </a:r>
+            <a:r>
+              <a:rPr lang="hu-HU" dirty="0"/>
+              <a:t> </a:t>
+            </a:r>
+            <a:r>
+              <a:rPr lang="hu-HU" dirty="0" err="1"/>
+              <a:t>significant</a:t>
+            </a:r>
+            <a:r>
+              <a:rPr lang="hu-HU" dirty="0"/>
+              <a:t> </a:t>
+            </a:r>
+            <a:r>
+              <a:rPr lang="hu-HU" dirty="0" err="1"/>
+              <a:t>with</a:t>
+            </a:r>
+            <a:r>
+              <a:rPr lang="hu-HU" dirty="0"/>
+              <a:t> </a:t>
+            </a:r>
+            <a:r>
+              <a:rPr lang="hu-HU" dirty="0" err="1"/>
+              <a:t>negative</a:t>
+            </a:r>
+            <a:r>
+              <a:rPr lang="hu-HU" dirty="0"/>
+              <a:t> </a:t>
+            </a:r>
+            <a:r>
+              <a:rPr lang="hu-HU" dirty="0" err="1"/>
+              <a:t>coefficient</a:t>
+            </a:r>
+            <a:endParaRPr lang="hu-HU" dirty="0"/>
+          </a:p>
+          <a:p>
+            <a:endParaRPr lang="hu-HU" dirty="0"/>
+          </a:p>
+          <a:p>
+            <a:r>
+              <a:rPr lang="hu-HU" b="1" dirty="0" err="1"/>
+              <a:t>Conclusion</a:t>
+            </a:r>
+            <a:r>
+              <a:rPr lang="hu-HU" b="1" dirty="0"/>
+              <a:t>:</a:t>
+            </a:r>
+          </a:p>
+          <a:p>
+            <a:pPr marL="285750" indent="-285750">
+              <a:buFont typeface="Arial" panose="020B0604020202020204" pitchFamily="34" charset="0"/>
+              <a:buChar char="•"/>
+            </a:pPr>
+            <a:r>
+              <a:rPr lang="hu-HU" dirty="0" err="1"/>
+              <a:t>High</a:t>
+            </a:r>
+            <a:r>
+              <a:rPr lang="hu-HU" dirty="0"/>
+              <a:t> </a:t>
+            </a:r>
+            <a:r>
+              <a:rPr lang="hu-HU" dirty="0" err="1"/>
+              <a:t>multicollinearity</a:t>
+            </a:r>
+            <a:r>
+              <a:rPr lang="hu-HU" dirty="0"/>
+              <a:t> </a:t>
+            </a:r>
+            <a:r>
+              <a:rPr lang="hu-HU" dirty="0" err="1"/>
+              <a:t>due</a:t>
+            </a:r>
+            <a:r>
+              <a:rPr lang="hu-HU" dirty="0"/>
+              <a:t> </a:t>
+            </a:r>
+            <a:r>
+              <a:rPr lang="hu-HU" dirty="0" err="1"/>
+              <a:t>to</a:t>
+            </a:r>
+            <a:r>
+              <a:rPr lang="hu-HU" dirty="0"/>
+              <a:t> </a:t>
+            </a:r>
+            <a:r>
+              <a:rPr lang="hu-HU" dirty="0" err="1"/>
+              <a:t>correlation</a:t>
+            </a:r>
+            <a:r>
+              <a:rPr lang="hu-HU" dirty="0"/>
+              <a:t> </a:t>
+            </a:r>
+            <a:r>
+              <a:rPr lang="hu-HU" dirty="0" err="1"/>
+              <a:t>between</a:t>
+            </a:r>
+            <a:r>
+              <a:rPr lang="hu-HU" dirty="0"/>
+              <a:t> </a:t>
+            </a:r>
+            <a:r>
+              <a:rPr lang="hu-HU" dirty="0" err="1"/>
+              <a:t>power</a:t>
+            </a:r>
+            <a:r>
+              <a:rPr lang="hu-HU" dirty="0"/>
+              <a:t> and </a:t>
+            </a:r>
+            <a:r>
+              <a:rPr lang="hu-HU" dirty="0" err="1"/>
+              <a:t>gas</a:t>
+            </a:r>
+            <a:r>
+              <a:rPr lang="hu-HU" dirty="0"/>
+              <a:t> </a:t>
+            </a:r>
+            <a:r>
+              <a:rPr lang="hu-HU" dirty="0" err="1"/>
+              <a:t>price</a:t>
+            </a:r>
+            <a:r>
+              <a:rPr lang="hu-HU" dirty="0"/>
+              <a:t> </a:t>
+            </a:r>
+            <a:r>
+              <a:rPr lang="hu-HU" dirty="0" err="1"/>
+              <a:t>features</a:t>
+            </a:r>
+            <a:endParaRPr lang="hu-HU" dirty="0"/>
+          </a:p>
+          <a:p>
+            <a:pPr marL="285750" indent="-285750">
+              <a:buFont typeface="Arial" panose="020B0604020202020204" pitchFamily="34" charset="0"/>
+              <a:buChar char="•"/>
+            </a:pPr>
+            <a:endParaRPr lang="en-GB" dirty="0"/>
+          </a:p>
+        </p:txBody>
+      </p:sp>
+      <p:pic>
+        <p:nvPicPr>
+          <p:cNvPr id="13" name="Picture 12">
+            <a:extLst>
+              <a:ext uri="{FF2B5EF4-FFF2-40B4-BE49-F238E27FC236}">
+                <a16:creationId xmlns:a16="http://schemas.microsoft.com/office/drawing/2014/main" id="{A42E70B8-D8A0-BADC-95A7-083AA860ED03}"/>
+              </a:ext>
+            </a:extLst>
+          </p:cNvPr>
+          <p:cNvPicPr>
+            <a:picLocks noChangeAspect="1"/>
+          </p:cNvPicPr>
+          <p:nvPr/>
+        </p:nvPicPr>
+        <p:blipFill>
+          <a:blip r:embed="rId2"/>
+          <a:stretch>
+            <a:fillRect/>
+          </a:stretch>
+        </p:blipFill>
+        <p:spPr>
+          <a:xfrm>
+            <a:off x="3644127" y="1522988"/>
+            <a:ext cx="5308085" cy="3960000"/>
+          </a:xfrm>
+          <a:prstGeom prst="rect">
+            <a:avLst/>
+          </a:prstGeom>
+        </p:spPr>
+      </p:pic>
     </p:spTree>
     <p:extLst>
       <p:ext uri="{BB962C8B-B14F-4D97-AF65-F5344CB8AC3E}">
@@ -14063,7 +14298,7 @@
         <p:spPr>
           <a:xfrm>
             <a:off x="319089" y="2510913"/>
-            <a:ext cx="8508999" cy="3962400"/>
+            <a:ext cx="3224213" cy="3671226"/>
           </a:xfrm>
         </p:spPr>
         <p:txBody>
@@ -14071,18 +14306,243 @@
           <a:lstStyle/>
           <a:p>
             <a:r>
-              <a:rPr lang="de-DE" dirty="0">
-                <a:highlight>
-                  <a:srgbClr val="FFFF00"/>
-                </a:highlight>
-              </a:rPr>
-              <a:t>Best Model</a:t>
-            </a:r>
-            <a:endParaRPr lang="en-GB" dirty="0">
-              <a:highlight>
-                <a:srgbClr val="FFFF00"/>
-              </a:highlight>
-            </a:endParaRPr>
+              <a:rPr lang="hu-HU" b="1" dirty="0" err="1"/>
+              <a:t>Results</a:t>
+            </a:r>
+            <a:r>
+              <a:rPr lang="hu-HU" b="1" dirty="0"/>
+              <a:t>:</a:t>
+            </a:r>
+          </a:p>
+          <a:p>
+            <a:pPr marL="285750" indent="-285750">
+              <a:buFont typeface="Arial" panose="020B0604020202020204" pitchFamily="34" charset="0"/>
+              <a:buChar char="•"/>
+            </a:pPr>
+            <a:r>
+              <a:rPr lang="hu-HU" dirty="0" err="1"/>
+              <a:t>Stronger</a:t>
+            </a:r>
+            <a:r>
+              <a:rPr lang="hu-HU" dirty="0"/>
+              <a:t> </a:t>
+            </a:r>
+            <a:r>
+              <a:rPr lang="hu-HU" dirty="0" err="1"/>
+              <a:t>models</a:t>
+            </a:r>
+            <a:r>
+              <a:rPr lang="hu-HU" dirty="0"/>
+              <a:t> </a:t>
+            </a:r>
+            <a:r>
+              <a:rPr lang="hu-HU" dirty="0" err="1"/>
+              <a:t>for</a:t>
+            </a:r>
+            <a:r>
+              <a:rPr lang="hu-HU" dirty="0"/>
+              <a:t> NYCA and NYC</a:t>
+            </a:r>
+          </a:p>
+          <a:p>
+            <a:pPr marL="285750" indent="-285750">
+              <a:buFont typeface="Arial" panose="020B0604020202020204" pitchFamily="34" charset="0"/>
+              <a:buChar char="•"/>
+            </a:pPr>
+            <a:r>
+              <a:rPr lang="hu-HU" dirty="0"/>
+              <a:t>ICAP </a:t>
+            </a:r>
+            <a:r>
+              <a:rPr lang="hu-HU" dirty="0" err="1"/>
+              <a:t>price</a:t>
+            </a:r>
+            <a:r>
+              <a:rPr lang="hu-HU" dirty="0"/>
+              <a:t> and </a:t>
+            </a:r>
+            <a:r>
+              <a:rPr lang="hu-HU" dirty="0" err="1"/>
+              <a:t>time-lags</a:t>
+            </a:r>
+            <a:r>
+              <a:rPr lang="hu-HU" dirty="0"/>
+              <a:t> </a:t>
+            </a:r>
+            <a:r>
+              <a:rPr lang="hu-HU" dirty="0" err="1"/>
+              <a:t>are</a:t>
+            </a:r>
+            <a:r>
+              <a:rPr lang="hu-HU" dirty="0"/>
+              <a:t> </a:t>
+            </a:r>
+            <a:r>
+              <a:rPr lang="hu-HU" dirty="0" err="1"/>
+              <a:t>significant</a:t>
+            </a:r>
+            <a:endParaRPr lang="hu-HU" dirty="0"/>
+          </a:p>
+          <a:p>
+            <a:pPr marL="285750" indent="-285750">
+              <a:buFont typeface="Arial" panose="020B0604020202020204" pitchFamily="34" charset="0"/>
+              <a:buChar char="•"/>
+            </a:pPr>
+            <a:r>
+              <a:rPr lang="hu-HU" dirty="0"/>
+              <a:t>Day-</a:t>
+            </a:r>
+            <a:r>
+              <a:rPr lang="hu-HU" dirty="0" err="1"/>
+              <a:t>ahead</a:t>
+            </a:r>
+            <a:r>
+              <a:rPr lang="hu-HU" dirty="0"/>
+              <a:t> </a:t>
+            </a:r>
+            <a:r>
+              <a:rPr lang="hu-HU" dirty="0" err="1"/>
+              <a:t>prices</a:t>
+            </a:r>
+            <a:r>
+              <a:rPr lang="hu-HU" dirty="0"/>
+              <a:t> </a:t>
+            </a:r>
+            <a:r>
+              <a:rPr lang="hu-HU" dirty="0" err="1"/>
+              <a:t>are</a:t>
+            </a:r>
+            <a:r>
+              <a:rPr lang="hu-HU" dirty="0"/>
+              <a:t> </a:t>
+            </a:r>
+            <a:r>
+              <a:rPr lang="hu-HU" dirty="0" err="1"/>
+              <a:t>insignificant</a:t>
+            </a:r>
+            <a:endParaRPr lang="hu-HU" dirty="0"/>
+          </a:p>
+          <a:p>
+            <a:endParaRPr lang="hu-HU" dirty="0"/>
+          </a:p>
+          <a:p>
+            <a:r>
+              <a:rPr lang="hu-HU" b="1" dirty="0" err="1"/>
+              <a:t>Conclusion</a:t>
+            </a:r>
+            <a:r>
+              <a:rPr lang="hu-HU" b="1" dirty="0"/>
+              <a:t>:</a:t>
+            </a:r>
+          </a:p>
+          <a:p>
+            <a:pPr marL="285750" indent="-285750">
+              <a:buFont typeface="Arial" panose="020B0604020202020204" pitchFamily="34" charset="0"/>
+              <a:buChar char="•"/>
+            </a:pPr>
+            <a:r>
+              <a:rPr lang="hu-HU" dirty="0" err="1"/>
+              <a:t>This</a:t>
+            </a:r>
+            <a:r>
+              <a:rPr lang="hu-HU" dirty="0"/>
+              <a:t> </a:t>
+            </a:r>
+            <a:r>
+              <a:rPr lang="hu-HU" dirty="0" err="1"/>
+              <a:t>model</a:t>
+            </a:r>
+            <a:r>
+              <a:rPr lang="hu-HU" dirty="0"/>
+              <a:t> </a:t>
+            </a:r>
+            <a:r>
+              <a:rPr lang="hu-HU" dirty="0" err="1"/>
+              <a:t>describes</a:t>
+            </a:r>
+            <a:r>
+              <a:rPr lang="hu-HU" dirty="0"/>
+              <a:t> </a:t>
+            </a:r>
+            <a:r>
+              <a:rPr lang="hu-HU" dirty="0" err="1"/>
+              <a:t>the</a:t>
+            </a:r>
+            <a:r>
+              <a:rPr lang="hu-HU" dirty="0"/>
+              <a:t> </a:t>
+            </a:r>
+            <a:r>
+              <a:rPr lang="hu-HU" dirty="0" err="1"/>
+              <a:t>capacity</a:t>
+            </a:r>
+            <a:r>
+              <a:rPr lang="hu-HU" dirty="0"/>
+              <a:t> market </a:t>
+            </a:r>
+            <a:r>
+              <a:rPr lang="hu-HU" dirty="0" err="1"/>
+              <a:t>fundamental</a:t>
+            </a:r>
+            <a:endParaRPr lang="hu-HU" dirty="0"/>
+          </a:p>
+          <a:p>
+            <a:pPr marL="285750" indent="-285750">
+              <a:buFont typeface="Arial" panose="020B0604020202020204" pitchFamily="34" charset="0"/>
+              <a:buChar char="•"/>
+            </a:pPr>
+            <a:r>
+              <a:rPr lang="hu-HU" dirty="0" err="1"/>
+              <a:t>Inverse</a:t>
+            </a:r>
+            <a:r>
+              <a:rPr lang="hu-HU" dirty="0"/>
+              <a:t>: </a:t>
+            </a:r>
+            <a:r>
+              <a:rPr lang="hu-HU" dirty="0" err="1"/>
+              <a:t>marginal</a:t>
+            </a:r>
+            <a:r>
+              <a:rPr lang="hu-HU" dirty="0"/>
+              <a:t> </a:t>
+            </a:r>
+            <a:r>
+              <a:rPr lang="hu-HU" dirty="0" err="1"/>
+              <a:t>utility</a:t>
+            </a:r>
+            <a:r>
+              <a:rPr lang="hu-HU" dirty="0"/>
+              <a:t> </a:t>
+            </a:r>
+            <a:r>
+              <a:rPr lang="hu-HU" dirty="0" err="1"/>
+              <a:t>curve</a:t>
+            </a:r>
+            <a:r>
+              <a:rPr lang="hu-HU" dirty="0"/>
+              <a:t> </a:t>
+            </a:r>
+            <a:r>
+              <a:rPr lang="hu-HU" dirty="0" err="1"/>
+              <a:t>for</a:t>
+            </a:r>
+            <a:r>
+              <a:rPr lang="hu-HU" dirty="0"/>
+              <a:t> </a:t>
+            </a:r>
+            <a:r>
+              <a:rPr lang="hu-HU" dirty="0" err="1"/>
+              <a:t>oversupply</a:t>
+            </a:r>
+            <a:endParaRPr lang="hu-HU" dirty="0"/>
+          </a:p>
+          <a:p>
+            <a:pPr marL="285750" indent="-285750">
+              <a:buFont typeface="Arial" panose="020B0604020202020204" pitchFamily="34" charset="0"/>
+              <a:buChar char="•"/>
+            </a:pPr>
+            <a:endParaRPr lang="en-GB" dirty="0"/>
           </a:p>
         </p:txBody>
       </p:sp>
@@ -14167,12 +14627,20 @@
           <a:lstStyle/>
           <a:p>
             <a:r>
-              <a:rPr lang="de-DE" sz="2000" dirty="0">
+              <a:rPr lang="hu-HU" sz="2000" dirty="0" err="1">
                 <a:solidFill>
                   <a:srgbClr val="0065BD"/>
                 </a:solidFill>
               </a:rPr>
-              <a:t>Final Model</a:t>
+              <a:t>Model</a:t>
+            </a:r>
+            <a:r>
+              <a:rPr lang="hu-HU" sz="2000" dirty="0">
+                <a:solidFill>
+                  <a:srgbClr val="0065BD"/>
+                </a:solidFill>
+              </a:rPr>
+              <a:t> B</a:t>
             </a:r>
             <a:endParaRPr lang="en-GB" sz="2000" dirty="0">
               <a:solidFill>
@@ -14215,6 +14683,36 @@
           </a:p>
         </p:txBody>
       </p:sp>
+      <p:pic>
+        <p:nvPicPr>
+          <p:cNvPr id="8" name="Picture 7">
+            <a:extLst>
+              <a:ext uri="{FF2B5EF4-FFF2-40B4-BE49-F238E27FC236}">
+                <a16:creationId xmlns:a16="http://schemas.microsoft.com/office/drawing/2014/main" id="{10A65EEA-BC9D-3E17-8049-37D725ABC0BC}"/>
+              </a:ext>
+            </a:extLst>
+          </p:cNvPr>
+          <p:cNvPicPr>
+            <a:picLocks noChangeAspect="1"/>
+          </p:cNvPicPr>
+          <p:nvPr/>
+        </p:nvPicPr>
+        <p:blipFill>
+          <a:blip r:embed="rId2"/>
+          <a:stretch>
+            <a:fillRect/>
+          </a:stretch>
+        </p:blipFill>
+        <p:spPr>
+          <a:xfrm>
+            <a:off x="3543302" y="1445975"/>
+            <a:ext cx="5308085" cy="3960000"/>
+          </a:xfrm>
+          <a:prstGeom prst="rect">
+            <a:avLst/>
+          </a:prstGeom>
+        </p:spPr>
+      </p:pic>
     </p:spTree>
     <p:extLst>
       <p:ext uri="{BB962C8B-B14F-4D97-AF65-F5344CB8AC3E}">
@@ -15433,7 +15931,7 @@
             </a:pPr>
             <a:r>
               <a:rPr lang="de-DE" sz="1600" dirty="0"/>
-              <a:t>Right time lags? (</a:t>
+              <a:t>Right time lags (</a:t>
             </a:r>
             <a:r>
               <a:rPr lang="de-DE" sz="1600" dirty="0" err="1"/>
@@ -15481,130 +15979,66 @@
           </a:p>
         </p:txBody>
       </p:sp>
-      <p:sp>
-        <p:nvSpPr>
-          <p:cNvPr id="8" name="Rechteck 7">
+      <p:pic>
+        <p:nvPicPr>
+          <p:cNvPr id="10" name="Picture 9">
             <a:extLst>
               <a:ext uri="{FF2B5EF4-FFF2-40B4-BE49-F238E27FC236}">
-                <a16:creationId xmlns:a16="http://schemas.microsoft.com/office/drawing/2014/main" id="{A7A1F708-BB18-44DE-AD8C-44AFB39DA3E1}"/>
+                <a16:creationId xmlns:a16="http://schemas.microsoft.com/office/drawing/2014/main" id="{EA9D5BEB-088A-A7D7-4E00-04CAB7FDB877}"/>
               </a:ext>
             </a:extLst>
           </p:cNvPr>
-          <p:cNvSpPr/>
+          <p:cNvPicPr>
+            <a:picLocks noChangeAspect="1"/>
+          </p:cNvPicPr>
           <p:nvPr/>
-        </p:nvSpPr>
+        </p:nvPicPr>
+        <p:blipFill>
+          <a:blip r:embed="rId6"/>
+          <a:stretch>
+            <a:fillRect/>
+          </a:stretch>
+        </p:blipFill>
         <p:spPr>
           <a:xfrm>
-            <a:off x="715090" y="2497394"/>
-            <a:ext cx="3522612" cy="1995948"/>
+            <a:off x="4627372" y="2084164"/>
+            <a:ext cx="4096566" cy="3060000"/>
           </a:xfrm>
           <a:prstGeom prst="rect">
             <a:avLst/>
           </a:prstGeom>
-          <a:ln>
-            <a:noFill/>
-          </a:ln>
         </p:spPr>
-        <p:style>
-          <a:lnRef idx="2">
-            <a:schemeClr val="accent1">
-              <a:shade val="50000"/>
-            </a:schemeClr>
-          </a:lnRef>
-          <a:fillRef idx="1">
-            <a:schemeClr val="accent1"/>
-          </a:fillRef>
-          <a:effectRef idx="0">
-            <a:schemeClr val="accent1"/>
-          </a:effectRef>
-          <a:fontRef idx="minor">
-            <a:schemeClr val="lt1"/>
-          </a:fontRef>
-        </p:style>
-        <p:txBody>
-          <a:bodyPr rot="0" spcFirstLastPara="0" vertOverflow="overflow" horzOverflow="overflow" vert="horz" wrap="square" lIns="91440" tIns="45720" rIns="91440" bIns="45720" numCol="1" spcCol="0" rtlCol="0" fromWordArt="0" anchor="t" anchorCtr="0" forceAA="0" compatLnSpc="1">
-            <a:prstTxWarp prst="textNoShape">
-              <a:avLst/>
-            </a:prstTxWarp>
-            <a:noAutofit/>
-          </a:bodyPr>
-          <a:lstStyle/>
-          <a:p>
-            <a:pPr algn="ctr">
-              <a:lnSpc>
-                <a:spcPct val="114000"/>
-              </a:lnSpc>
-            </a:pPr>
-            <a:r>
-              <a:rPr lang="de-DE" dirty="0"/>
-              <a:t>ICAP</a:t>
-            </a:r>
-            <a:endParaRPr lang="en-GB" dirty="0"/>
-          </a:p>
-        </p:txBody>
-      </p:sp>
-      <p:sp>
-        <p:nvSpPr>
-          <p:cNvPr id="12" name="Rechteck 11">
+      </p:pic>
+      <p:pic>
+        <p:nvPicPr>
+          <p:cNvPr id="14" name="Picture 13">
             <a:extLst>
               <a:ext uri="{FF2B5EF4-FFF2-40B4-BE49-F238E27FC236}">
-                <a16:creationId xmlns:a16="http://schemas.microsoft.com/office/drawing/2014/main" id="{D988DA57-60E8-47B6-84D6-CE75FD148755}"/>
+                <a16:creationId xmlns:a16="http://schemas.microsoft.com/office/drawing/2014/main" id="{B6A3CDFA-198C-1CAB-08E0-83B4BD48DE8F}"/>
               </a:ext>
             </a:extLst>
           </p:cNvPr>
-          <p:cNvSpPr/>
+          <p:cNvPicPr>
+            <a:picLocks noChangeAspect="1"/>
+          </p:cNvPicPr>
           <p:nvPr/>
-        </p:nvSpPr>
+        </p:nvPicPr>
+        <p:blipFill>
+          <a:blip r:embed="rId7"/>
+          <a:stretch>
+            <a:fillRect/>
+          </a:stretch>
+        </p:blipFill>
         <p:spPr>
           <a:xfrm>
-            <a:off x="4662742" y="2465872"/>
-            <a:ext cx="3522612" cy="1995948"/>
+            <a:off x="426656" y="2084164"/>
+            <a:ext cx="4096566" cy="3060000"/>
           </a:xfrm>
           <a:prstGeom prst="rect">
             <a:avLst/>
           </a:prstGeom>
-          <a:ln>
-            <a:noFill/>
-          </a:ln>
         </p:spPr>
-        <p:style>
-          <a:lnRef idx="2">
-            <a:schemeClr val="accent1">
-              <a:shade val="50000"/>
-            </a:schemeClr>
-          </a:lnRef>
-          <a:fillRef idx="1">
-            <a:schemeClr val="accent1"/>
-          </a:fillRef>
-          <a:effectRef idx="0">
-            <a:schemeClr val="accent1"/>
-          </a:effectRef>
-          <a:fontRef idx="minor">
-            <a:schemeClr val="lt1"/>
-          </a:fontRef>
-        </p:style>
-        <p:txBody>
-          <a:bodyPr rot="0" spcFirstLastPara="0" vertOverflow="overflow" horzOverflow="overflow" vert="horz" wrap="square" lIns="91440" tIns="45720" rIns="91440" bIns="45720" numCol="1" spcCol="0" rtlCol="0" fromWordArt="0" anchor="t" anchorCtr="0" forceAA="0" compatLnSpc="1">
-            <a:prstTxWarp prst="textNoShape">
-              <a:avLst/>
-            </a:prstTxWarp>
-            <a:noAutofit/>
-          </a:bodyPr>
-          <a:lstStyle/>
-          <a:p>
-            <a:pPr algn="ctr">
-              <a:lnSpc>
-                <a:spcPct val="114000"/>
-              </a:lnSpc>
-            </a:pPr>
-            <a:r>
-              <a:rPr lang="de-DE" dirty="0" err="1"/>
-              <a:t>Oversupply</a:t>
-            </a:r>
-            <a:endParaRPr lang="en-GB" dirty="0"/>
-          </a:p>
-        </p:txBody>
-      </p:sp>
+      </p:pic>
     </p:spTree>
     <p:extLst>
       <p:ext uri="{BB962C8B-B14F-4D97-AF65-F5344CB8AC3E}">
@@ -16792,29 +17226,10 @@
               <a:buChar char="-"/>
             </a:pPr>
             <a:r>
-              <a:rPr lang="de-DE" sz="1200" dirty="0">
-                <a:highlight>
-                  <a:srgbClr val="FFFF00"/>
-                </a:highlight>
-              </a:rPr>
-              <a:t>Day-</a:t>
-            </a:r>
-            <a:r>
-              <a:rPr lang="de-DE" sz="1200" dirty="0" err="1">
-                <a:highlight>
-                  <a:srgbClr val="FFFF00"/>
-                </a:highlight>
-              </a:rPr>
-              <a:t>Ahead</a:t>
-            </a:r>
-            <a:r>
-              <a:rPr lang="de-DE" sz="1200" dirty="0">
-                <a:highlight>
-                  <a:srgbClr val="FFFF00"/>
-                </a:highlight>
-              </a:rPr>
-              <a:t> Prices</a:t>
-            </a:r>
+              <a:rPr lang="de-DE" sz="1200" dirty="0"/>
+              <a:t>https://www.nyiso.com/energy-market-operational-data</a:t>
+            </a:r>
+            <a:endParaRPr lang="hu-HU" sz="1200" dirty="0"/>
           </a:p>
           <a:p>
             <a:pPr marL="285750" indent="-285750">
@@ -16822,20 +17237,8 @@
               <a:buChar char="-"/>
             </a:pPr>
             <a:r>
-              <a:rPr lang="de-DE" sz="1200" dirty="0" err="1">
-                <a:highlight>
-                  <a:srgbClr val="FFFF00"/>
-                </a:highlight>
-              </a:rPr>
-              <a:t>Capacity</a:t>
-            </a:r>
-            <a:r>
-              <a:rPr lang="de-DE" sz="1200" dirty="0">
-                <a:highlight>
-                  <a:srgbClr val="FFFF00"/>
-                </a:highlight>
-              </a:rPr>
-              <a:t> Prices</a:t>
+              <a:rPr lang="de-DE" sz="1200" dirty="0"/>
+              <a:t>http://icap.nyiso.com/ucap/public/auc_view_spot_detail.do</a:t>
             </a:r>
           </a:p>
           <a:p>
@@ -17389,7 +17792,7 @@
 </file>
 
 <file path=ppt/slides/slide19.xml><?xml version="1.0" encoding="utf-8"?>
-<p:sld xmlns:a="http://schemas.openxmlformats.org/drawingml/2006/main" xmlns:r="http://schemas.openxmlformats.org/officeDocument/2006/relationships" xmlns:p="http://schemas.openxmlformats.org/presentationml/2006/main" show="0">
+<p:sld xmlns:a="http://schemas.openxmlformats.org/drawingml/2006/main" xmlns:r="http://schemas.openxmlformats.org/officeDocument/2006/relationships" xmlns:p="http://schemas.openxmlformats.org/presentationml/2006/main">
   <p:cSld>
     <p:spTree>
       <p:nvGrpSpPr>
@@ -17514,45 +17917,47 @@
           <a:lstStyle/>
           <a:p>
             <a:r>
-              <a:rPr lang="de-DE" dirty="0" err="1"/>
-              <a:t>Safety-copy</a:t>
-            </a:r>
-            <a:r>
-              <a:rPr lang="de-DE" dirty="0"/>
-              <a:t> </a:t>
-            </a:r>
-            <a:r>
-              <a:rPr lang="de-DE" dirty="0" err="1"/>
-              <a:t>slides</a:t>
-            </a:r>
-            <a:r>
-              <a:rPr lang="de-DE" dirty="0"/>
-              <a:t> (</a:t>
-            </a:r>
-            <a:r>
-              <a:rPr lang="de-DE" dirty="0" err="1"/>
-              <a:t>duplicated</a:t>
-            </a:r>
-            <a:r>
-              <a:rPr lang="de-DE" dirty="0"/>
-              <a:t> </a:t>
-            </a:r>
-            <a:r>
-              <a:rPr lang="de-DE" dirty="0" err="1"/>
-              <a:t>versions</a:t>
-            </a:r>
-            <a:r>
-              <a:rPr lang="de-DE" dirty="0"/>
-              <a:t>)</a:t>
+              <a:rPr lang="hu-HU" dirty="0" err="1"/>
+              <a:t>Regressions</a:t>
             </a:r>
             <a:endParaRPr lang="en-US" dirty="0"/>
           </a:p>
         </p:txBody>
       </p:sp>
+      <p:pic>
+        <p:nvPicPr>
+          <p:cNvPr id="6" name="Picture 5">
+            <a:extLst>
+              <a:ext uri="{FF2B5EF4-FFF2-40B4-BE49-F238E27FC236}">
+                <a16:creationId xmlns:a16="http://schemas.microsoft.com/office/drawing/2014/main" id="{3366C2DE-E9E7-223A-CC83-1C828EBDD429}"/>
+              </a:ext>
+            </a:extLst>
+          </p:cNvPr>
+          <p:cNvPicPr>
+            <a:picLocks noChangeAspect="1"/>
+          </p:cNvPicPr>
+          <p:nvPr/>
+        </p:nvPicPr>
+        <p:blipFill>
+          <a:blip r:embed="rId2"/>
+          <a:stretch>
+            <a:fillRect/>
+          </a:stretch>
+        </p:blipFill>
+        <p:spPr>
+          <a:xfrm>
+            <a:off x="1226492" y="1497615"/>
+            <a:ext cx="6691015" cy="4864498"/>
+          </a:xfrm>
+          <a:prstGeom prst="rect">
+            <a:avLst/>
+          </a:prstGeom>
+        </p:spPr>
+      </p:pic>
     </p:spTree>
     <p:extLst>
       <p:ext uri="{BB962C8B-B14F-4D97-AF65-F5344CB8AC3E}">
-        <p14:creationId xmlns:p14="http://schemas.microsoft.com/office/powerpoint/2010/main" val="2965252113"/>
+        <p14:creationId xmlns:p14="http://schemas.microsoft.com/office/powerpoint/2010/main" val="2851998455"/>
       </p:ext>
     </p:extLst>
   </p:cSld>
@@ -17916,6 +18321,368 @@
 </file>
 
 <file path=ppt/slides/slide20.xml><?xml version="1.0" encoding="utf-8"?>
+<p:sld xmlns:a="http://schemas.openxmlformats.org/drawingml/2006/main" xmlns:r="http://schemas.openxmlformats.org/officeDocument/2006/relationships" xmlns:p="http://schemas.openxmlformats.org/presentationml/2006/main">
+  <p:cSld>
+    <p:spTree>
+      <p:nvGrpSpPr>
+        <p:cNvPr id="1" name=""/>
+        <p:cNvGrpSpPr/>
+        <p:nvPr/>
+      </p:nvGrpSpPr>
+      <p:grpSpPr>
+        <a:xfrm>
+          <a:off x="0" y="0"/>
+          <a:ext cx="0" cy="0"/>
+          <a:chOff x="0" y="0"/>
+          <a:chExt cx="0" cy="0"/>
+        </a:xfrm>
+      </p:grpSpPr>
+      <p:sp>
+        <p:nvSpPr>
+          <p:cNvPr id="3" name="Foliennummernplatzhalter 2">
+            <a:extLst>
+              <a:ext uri="{FF2B5EF4-FFF2-40B4-BE49-F238E27FC236}">
+                <a16:creationId xmlns:a16="http://schemas.microsoft.com/office/drawing/2014/main" id="{66420CAD-D433-4EC3-B425-67F173F9EFDF}"/>
+              </a:ext>
+            </a:extLst>
+          </p:cNvPr>
+          <p:cNvSpPr>
+            <a:spLocks noGrp="1"/>
+          </p:cNvSpPr>
+          <p:nvPr>
+            <p:ph type="sldNum" sz="quarter" idx="11"/>
+          </p:nvPr>
+        </p:nvSpPr>
+        <p:spPr/>
+        <p:txBody>
+          <a:bodyPr/>
+          <a:lstStyle/>
+          <a:p>
+            <a:fld id="{CE58CB1E-F828-4F11-99E0-327109AF9DA4}" type="slidenum">
+              <a:rPr lang="de-DE" smtClean="0"/>
+              <a:pPr/>
+              <a:t>20</a:t>
+            </a:fld>
+            <a:endParaRPr lang="de-DE"/>
+          </a:p>
+        </p:txBody>
+      </p:sp>
+      <p:sp>
+        <p:nvSpPr>
+          <p:cNvPr id="4" name="Fußzeilenplatzhalter 3">
+            <a:extLst>
+              <a:ext uri="{FF2B5EF4-FFF2-40B4-BE49-F238E27FC236}">
+                <a16:creationId xmlns:a16="http://schemas.microsoft.com/office/drawing/2014/main" id="{07C6311F-57BB-4FF9-BA0A-4E57C3E0D7A4}"/>
+              </a:ext>
+            </a:extLst>
+          </p:cNvPr>
+          <p:cNvSpPr>
+            <a:spLocks noGrp="1"/>
+          </p:cNvSpPr>
+          <p:nvPr>
+            <p:ph type="ftr" sz="quarter" idx="12"/>
+          </p:nvPr>
+        </p:nvSpPr>
+        <p:spPr/>
+        <p:txBody>
+          <a:bodyPr/>
+          <a:lstStyle/>
+          <a:p>
+            <a:r>
+              <a:rPr lang="de-DE" dirty="0" err="1"/>
+              <a:t>Máté</a:t>
+            </a:r>
+            <a:r>
+              <a:rPr lang="de-DE" dirty="0"/>
+              <a:t> </a:t>
+            </a:r>
+            <a:r>
+              <a:rPr lang="de-DE" dirty="0" err="1"/>
+              <a:t>Borvendég</a:t>
+            </a:r>
+            <a:r>
+              <a:rPr lang="de-DE" dirty="0"/>
+              <a:t>, Susanne Hantke | </a:t>
+            </a:r>
+            <a:r>
+              <a:rPr lang="de-DE" dirty="0" err="1"/>
+              <a:t>Capacity</a:t>
+            </a:r>
+            <a:r>
+              <a:rPr lang="de-DE" dirty="0"/>
+              <a:t> </a:t>
+            </a:r>
+            <a:r>
+              <a:rPr lang="de-DE" dirty="0" err="1"/>
+              <a:t>Markets</a:t>
+            </a:r>
+            <a:r>
+              <a:rPr lang="de-DE" dirty="0"/>
+              <a:t> | 21.06.2023</a:t>
+            </a:r>
+            <a:endParaRPr lang="en-US" dirty="0"/>
+          </a:p>
+        </p:txBody>
+      </p:sp>
+      <p:sp>
+        <p:nvSpPr>
+          <p:cNvPr id="5" name="Titel 4">
+            <a:extLst>
+              <a:ext uri="{FF2B5EF4-FFF2-40B4-BE49-F238E27FC236}">
+                <a16:creationId xmlns:a16="http://schemas.microsoft.com/office/drawing/2014/main" id="{29F93F66-CEEE-4366-A159-7BF1E4E0ECD6}"/>
+              </a:ext>
+            </a:extLst>
+          </p:cNvPr>
+          <p:cNvSpPr>
+            <a:spLocks noGrp="1"/>
+          </p:cNvSpPr>
+          <p:nvPr>
+            <p:ph type="title"/>
+          </p:nvPr>
+        </p:nvSpPr>
+        <p:spPr/>
+        <p:txBody>
+          <a:bodyPr/>
+          <a:lstStyle/>
+          <a:p>
+            <a:r>
+              <a:rPr lang="hu-HU" dirty="0" err="1"/>
+              <a:t>Regressions</a:t>
+            </a:r>
+            <a:r>
+              <a:rPr lang="hu-HU" dirty="0"/>
+              <a:t> (</a:t>
+            </a:r>
+            <a:r>
+              <a:rPr lang="hu-HU" dirty="0" err="1"/>
+              <a:t>Gas</a:t>
+            </a:r>
+            <a:r>
+              <a:rPr lang="hu-HU" dirty="0"/>
+              <a:t>)</a:t>
+            </a:r>
+            <a:endParaRPr lang="en-US" dirty="0"/>
+          </a:p>
+        </p:txBody>
+      </p:sp>
+      <p:pic>
+        <p:nvPicPr>
+          <p:cNvPr id="7" name="Picture 6">
+            <a:extLst>
+              <a:ext uri="{FF2B5EF4-FFF2-40B4-BE49-F238E27FC236}">
+                <a16:creationId xmlns:a16="http://schemas.microsoft.com/office/drawing/2014/main" id="{630E33E2-A0DF-56B1-F301-0C7CDE8DA568}"/>
+              </a:ext>
+            </a:extLst>
+          </p:cNvPr>
+          <p:cNvPicPr>
+            <a:picLocks noChangeAspect="1"/>
+          </p:cNvPicPr>
+          <p:nvPr/>
+        </p:nvPicPr>
+        <p:blipFill>
+          <a:blip r:embed="rId2"/>
+          <a:stretch>
+            <a:fillRect/>
+          </a:stretch>
+        </p:blipFill>
+        <p:spPr>
+          <a:xfrm>
+            <a:off x="1566443" y="1442523"/>
+            <a:ext cx="6011114" cy="5049078"/>
+          </a:xfrm>
+          <a:prstGeom prst="rect">
+            <a:avLst/>
+          </a:prstGeom>
+        </p:spPr>
+      </p:pic>
+    </p:spTree>
+    <p:extLst>
+      <p:ext uri="{BB962C8B-B14F-4D97-AF65-F5344CB8AC3E}">
+        <p14:creationId xmlns:p14="http://schemas.microsoft.com/office/powerpoint/2010/main" val="1432437779"/>
+      </p:ext>
+    </p:extLst>
+  </p:cSld>
+  <p:clrMapOvr>
+    <a:masterClrMapping/>
+  </p:clrMapOvr>
+</p:sld>
+</file>
+
+<file path=ppt/slides/slide21.xml><?xml version="1.0" encoding="utf-8"?>
+<p:sld xmlns:a="http://schemas.openxmlformats.org/drawingml/2006/main" xmlns:r="http://schemas.openxmlformats.org/officeDocument/2006/relationships" xmlns:p="http://schemas.openxmlformats.org/presentationml/2006/main" show="0">
+  <p:cSld>
+    <p:spTree>
+      <p:nvGrpSpPr>
+        <p:cNvPr id="1" name=""/>
+        <p:cNvGrpSpPr/>
+        <p:nvPr/>
+      </p:nvGrpSpPr>
+      <p:grpSpPr>
+        <a:xfrm>
+          <a:off x="0" y="0"/>
+          <a:ext cx="0" cy="0"/>
+          <a:chOff x="0" y="0"/>
+          <a:chExt cx="0" cy="0"/>
+        </a:xfrm>
+      </p:grpSpPr>
+      <p:sp>
+        <p:nvSpPr>
+          <p:cNvPr id="3" name="Foliennummernplatzhalter 2">
+            <a:extLst>
+              <a:ext uri="{FF2B5EF4-FFF2-40B4-BE49-F238E27FC236}">
+                <a16:creationId xmlns:a16="http://schemas.microsoft.com/office/drawing/2014/main" id="{66420CAD-D433-4EC3-B425-67F173F9EFDF}"/>
+              </a:ext>
+            </a:extLst>
+          </p:cNvPr>
+          <p:cNvSpPr>
+            <a:spLocks noGrp="1"/>
+          </p:cNvSpPr>
+          <p:nvPr>
+            <p:ph type="sldNum" sz="quarter" idx="11"/>
+          </p:nvPr>
+        </p:nvSpPr>
+        <p:spPr/>
+        <p:txBody>
+          <a:bodyPr/>
+          <a:lstStyle/>
+          <a:p>
+            <a:fld id="{CE58CB1E-F828-4F11-99E0-327109AF9DA4}" type="slidenum">
+              <a:rPr lang="de-DE" smtClean="0"/>
+              <a:pPr/>
+              <a:t>21</a:t>
+            </a:fld>
+            <a:endParaRPr lang="de-DE"/>
+          </a:p>
+        </p:txBody>
+      </p:sp>
+      <p:sp>
+        <p:nvSpPr>
+          <p:cNvPr id="4" name="Fußzeilenplatzhalter 3">
+            <a:extLst>
+              <a:ext uri="{FF2B5EF4-FFF2-40B4-BE49-F238E27FC236}">
+                <a16:creationId xmlns:a16="http://schemas.microsoft.com/office/drawing/2014/main" id="{07C6311F-57BB-4FF9-BA0A-4E57C3E0D7A4}"/>
+              </a:ext>
+            </a:extLst>
+          </p:cNvPr>
+          <p:cNvSpPr>
+            <a:spLocks noGrp="1"/>
+          </p:cNvSpPr>
+          <p:nvPr>
+            <p:ph type="ftr" sz="quarter" idx="12"/>
+          </p:nvPr>
+        </p:nvSpPr>
+        <p:spPr/>
+        <p:txBody>
+          <a:bodyPr/>
+          <a:lstStyle/>
+          <a:p>
+            <a:r>
+              <a:rPr lang="de-DE" dirty="0" err="1"/>
+              <a:t>Máté</a:t>
+            </a:r>
+            <a:r>
+              <a:rPr lang="de-DE" dirty="0"/>
+              <a:t> </a:t>
+            </a:r>
+            <a:r>
+              <a:rPr lang="de-DE" dirty="0" err="1"/>
+              <a:t>Borvendég</a:t>
+            </a:r>
+            <a:r>
+              <a:rPr lang="de-DE" dirty="0"/>
+              <a:t>, Susanne Hantke | </a:t>
+            </a:r>
+            <a:r>
+              <a:rPr lang="de-DE" dirty="0" err="1"/>
+              <a:t>Capacity</a:t>
+            </a:r>
+            <a:r>
+              <a:rPr lang="de-DE" dirty="0"/>
+              <a:t> </a:t>
+            </a:r>
+            <a:r>
+              <a:rPr lang="de-DE" dirty="0" err="1"/>
+              <a:t>Markets</a:t>
+            </a:r>
+            <a:r>
+              <a:rPr lang="de-DE" dirty="0"/>
+              <a:t> | 21.06.2023</a:t>
+            </a:r>
+            <a:endParaRPr lang="en-US" dirty="0"/>
+          </a:p>
+        </p:txBody>
+      </p:sp>
+      <p:sp>
+        <p:nvSpPr>
+          <p:cNvPr id="5" name="Titel 4">
+            <a:extLst>
+              <a:ext uri="{FF2B5EF4-FFF2-40B4-BE49-F238E27FC236}">
+                <a16:creationId xmlns:a16="http://schemas.microsoft.com/office/drawing/2014/main" id="{29F93F66-CEEE-4366-A159-7BF1E4E0ECD6}"/>
+              </a:ext>
+            </a:extLst>
+          </p:cNvPr>
+          <p:cNvSpPr>
+            <a:spLocks noGrp="1"/>
+          </p:cNvSpPr>
+          <p:nvPr>
+            <p:ph type="title"/>
+          </p:nvPr>
+        </p:nvSpPr>
+        <p:spPr/>
+        <p:txBody>
+          <a:bodyPr/>
+          <a:lstStyle/>
+          <a:p>
+            <a:r>
+              <a:rPr lang="de-DE" dirty="0" err="1"/>
+              <a:t>Safety-copy</a:t>
+            </a:r>
+            <a:r>
+              <a:rPr lang="de-DE" dirty="0"/>
+              <a:t> </a:t>
+            </a:r>
+            <a:r>
+              <a:rPr lang="de-DE" dirty="0" err="1"/>
+              <a:t>slides</a:t>
+            </a:r>
+            <a:r>
+              <a:rPr lang="de-DE" dirty="0"/>
+              <a:t> (</a:t>
+            </a:r>
+            <a:r>
+              <a:rPr lang="de-DE" dirty="0" err="1"/>
+              <a:t>duplicated</a:t>
+            </a:r>
+            <a:r>
+              <a:rPr lang="de-DE" dirty="0"/>
+              <a:t> </a:t>
+            </a:r>
+            <a:r>
+              <a:rPr lang="de-DE" dirty="0" err="1"/>
+              <a:t>versions</a:t>
+            </a:r>
+            <a:r>
+              <a:rPr lang="de-DE" dirty="0"/>
+              <a:t>)</a:t>
+            </a:r>
+            <a:endParaRPr lang="en-US" dirty="0"/>
+          </a:p>
+        </p:txBody>
+      </p:sp>
+    </p:spTree>
+    <p:extLst>
+      <p:ext uri="{BB962C8B-B14F-4D97-AF65-F5344CB8AC3E}">
+        <p14:creationId xmlns:p14="http://schemas.microsoft.com/office/powerpoint/2010/main" val="2965252113"/>
+      </p:ext>
+    </p:extLst>
+  </p:cSld>
+  <p:clrMapOvr>
+    <a:masterClrMapping/>
+  </p:clrMapOvr>
+</p:sld>
+</file>
+
+<file path=ppt/slides/slide22.xml><?xml version="1.0" encoding="utf-8"?>
 <p:sld xmlns:a="http://schemas.openxmlformats.org/drawingml/2006/main" xmlns:r="http://schemas.openxmlformats.org/officeDocument/2006/relationships" xmlns:p="http://schemas.openxmlformats.org/presentationml/2006/main" show="0">
   <p:cSld>
     <p:spTree>
@@ -18079,7 +18846,7 @@
             <a:fld id="{CE58CB1E-F828-4F11-99E0-327109AF9DA4}" type="slidenum">
               <a:rPr lang="de-DE" smtClean="0"/>
               <a:pPr/>
-              <a:t>20</a:t>
+              <a:t>22</a:t>
             </a:fld>
             <a:endParaRPr lang="de-DE"/>
           </a:p>
@@ -19298,7 +20065,7 @@
 </p:sld>
 </file>
 
-<file path=ppt/slides/slide21.xml><?xml version="1.0" encoding="utf-8"?>
+<file path=ppt/slides/slide23.xml><?xml version="1.0" encoding="utf-8"?>
 <p:sld xmlns:a="http://schemas.openxmlformats.org/drawingml/2006/main" xmlns:r="http://schemas.openxmlformats.org/officeDocument/2006/relationships" xmlns:p="http://schemas.openxmlformats.org/presentationml/2006/main" show="0">
   <p:cSld>
     <p:spTree>
@@ -19427,7 +20194,7 @@
             <a:fld id="{CE58CB1E-F828-4F11-99E0-327109AF9DA4}" type="slidenum">
               <a:rPr lang="de-DE" smtClean="0"/>
               <a:pPr/>
-              <a:t>21</a:t>
+              <a:t>23</a:t>
             </a:fld>
             <a:endParaRPr lang="de-DE"/>
           </a:p>
@@ -23608,8 +24375,8 @@
           <a:chExt cx="0" cy="0"/>
         </a:xfrm>
       </p:grpSpPr>
-      <mc:AlternateContent xmlns:mc="http://schemas.openxmlformats.org/markup-compatibility/2006">
-        <mc:Choice xmlns:a14="http://schemas.microsoft.com/office/drawing/2010/main" Requires="a14">
+      <mc:AlternateContent xmlns:mc="http://schemas.openxmlformats.org/markup-compatibility/2006" xmlns:a14="http://schemas.microsoft.com/office/drawing/2010/main">
+        <mc:Choice Requires="a14">
           <p:sp>
             <p:nvSpPr>
               <p:cNvPr id="2" name="Inhaltsplatzhalter 1">
@@ -23943,13 +24710,7 @@
                       <a:rPr lang="de-DE" b="1" i="1">
                         <a:latin typeface="Cambria Math" panose="02040503050406030204" pitchFamily="18" charset="0"/>
                       </a:rPr>
-                      <m:t>−</m:t>
-                    </m:r>
-                    <m:r>
-                      <a:rPr lang="de-DE" b="1" i="1">
-                        <a:latin typeface="Cambria Math" panose="02040503050406030204" pitchFamily="18" charset="0"/>
-                      </a:rPr>
-                      <m:t> </m:t>
+                      <m:t>− </m:t>
                     </m:r>
                     <m:sSub>
                       <m:sSubPr>
@@ -24111,7 +24872,7 @@
             </p:txBody>
           </p:sp>
         </mc:Choice>
-        <mc:Fallback>
+        <mc:Fallback xmlns="">
           <p:sp>
             <p:nvSpPr>
               <p:cNvPr id="2" name="Inhaltsplatzhalter 1">
@@ -24263,8 +25024,8 @@
           </a:p>
         </p:txBody>
       </p:sp>
-      <mc:AlternateContent xmlns:mc="http://schemas.openxmlformats.org/markup-compatibility/2006">
-        <mc:Choice xmlns:a14="http://schemas.microsoft.com/office/drawing/2010/main" Requires="a14">
+      <mc:AlternateContent xmlns:mc="http://schemas.openxmlformats.org/markup-compatibility/2006" xmlns:a14="http://schemas.microsoft.com/office/drawing/2010/main">
+        <mc:Choice Requires="a14">
           <p:sp>
             <p:nvSpPr>
               <p:cNvPr id="6" name="Rechteck 5">
@@ -24624,7 +25385,7 @@
             </p:txBody>
           </p:sp>
         </mc:Choice>
-        <mc:Fallback>
+        <mc:Fallback xmlns="">
           <p:sp>
             <p:nvSpPr>
               <p:cNvPr id="6" name="Rechteck 5">
@@ -27100,7 +27861,7 @@
       </p:pic>
       <p:pic>
         <p:nvPicPr>
-          <p:cNvPr id="8" name="Picture 7">
+          <p:cNvPr id="8" name="Content Placeholder 7">
             <a:extLst>
               <a:ext uri="{FF2B5EF4-FFF2-40B4-BE49-F238E27FC236}">
                 <a16:creationId xmlns:a16="http://schemas.microsoft.com/office/drawing/2014/main" id="{3B1E56E5-7EFC-4F68-82BC-844B583FDEDE}"/>

</xml_diff>

<commit_message>
(almost) final regression plots
</commit_message>
<xml_diff>
--- a/Final_Presentation_Borvendeg_Hantke.pptx
+++ b/Final_Presentation_Borvendeg_Hantke.pptx
@@ -4149,8 +4149,12 @@
           </a:lstStyle>
           <a:p>
             <a:r>
+              <a:rPr lang="de-DE" dirty="0"/>
+              <a:t>Máté Borvendég, Susanne Hantke | </a:t>
+            </a:r>
+            <a:r>
               <a:rPr lang="de-DE" dirty="0" err="1"/>
-              <a:t>Máté</a:t>
+              <a:t>Capacity</a:t>
             </a:r>
             <a:r>
               <a:rPr lang="de-DE" dirty="0"/>
@@ -4158,27 +4162,11 @@
             </a:r>
             <a:r>
               <a:rPr lang="de-DE" dirty="0" err="1"/>
-              <a:t>Borvendég</a:t>
+              <a:t>Markets</a:t>
             </a:r>
             <a:r>
               <a:rPr lang="de-DE" dirty="0"/>
-              <a:t>, Susanne Hantke | </a:t>
-            </a:r>
-            <a:r>
-              <a:rPr lang="de-DE" dirty="0" err="1"/>
-              <a:t>Capacity</a:t>
-            </a:r>
-            <a:r>
-              <a:rPr lang="de-DE" dirty="0"/>
-              <a:t> </a:t>
-            </a:r>
-            <a:r>
-              <a:rPr lang="de-DE" dirty="0" err="1"/>
-              <a:t>Markets</a:t>
-            </a:r>
-            <a:r>
-              <a:rPr lang="de-DE" dirty="0"/>
-              <a:t> | 21.06.2023</a:t>
+              <a:t> | 22.06.2023</a:t>
             </a:r>
             <a:endParaRPr lang="en-US" dirty="0"/>
           </a:p>
@@ -4745,8 +4733,12 @@
           </a:lstStyle>
           <a:p>
             <a:r>
+              <a:rPr lang="de-DE" dirty="0"/>
+              <a:t>Máté Borvendég, Susanne Hantke | </a:t>
+            </a:r>
+            <a:r>
               <a:rPr lang="de-DE" dirty="0" err="1"/>
-              <a:t>Máté</a:t>
+              <a:t>Capacity</a:t>
             </a:r>
             <a:r>
               <a:rPr lang="de-DE" dirty="0"/>
@@ -4754,27 +4746,11 @@
             </a:r>
             <a:r>
               <a:rPr lang="de-DE" dirty="0" err="1"/>
-              <a:t>Borvendég</a:t>
+              <a:t>Markets</a:t>
             </a:r>
             <a:r>
               <a:rPr lang="de-DE" dirty="0"/>
-              <a:t>, Susanne Hantke | </a:t>
-            </a:r>
-            <a:r>
-              <a:rPr lang="de-DE" dirty="0" err="1"/>
-              <a:t>Capacity</a:t>
-            </a:r>
-            <a:r>
-              <a:rPr lang="de-DE" dirty="0"/>
-              <a:t> </a:t>
-            </a:r>
-            <a:r>
-              <a:rPr lang="de-DE" dirty="0" err="1"/>
-              <a:t>Markets</a:t>
-            </a:r>
-            <a:r>
-              <a:rPr lang="de-DE" dirty="0"/>
-              <a:t> | 21.06.2023</a:t>
+              <a:t> | 22.06.2023</a:t>
             </a:r>
             <a:endParaRPr lang="en-US" dirty="0"/>
           </a:p>
@@ -4981,8 +4957,12 @@
           </a:lstStyle>
           <a:p>
             <a:r>
+              <a:rPr lang="de-DE" dirty="0"/>
+              <a:t>Máté Borvendég, Susanne Hantke | </a:t>
+            </a:r>
+            <a:r>
               <a:rPr lang="de-DE" dirty="0" err="1"/>
-              <a:t>Máté</a:t>
+              <a:t>Capacity</a:t>
             </a:r>
             <a:r>
               <a:rPr lang="de-DE" dirty="0"/>
@@ -4990,27 +4970,11 @@
             </a:r>
             <a:r>
               <a:rPr lang="de-DE" dirty="0" err="1"/>
-              <a:t>Borvendég</a:t>
+              <a:t>Markets</a:t>
             </a:r>
             <a:r>
               <a:rPr lang="de-DE" dirty="0"/>
-              <a:t>, Susanne Hantke | </a:t>
-            </a:r>
-            <a:r>
-              <a:rPr lang="de-DE" dirty="0" err="1"/>
-              <a:t>Capacity</a:t>
-            </a:r>
-            <a:r>
-              <a:rPr lang="de-DE" dirty="0"/>
-              <a:t> </a:t>
-            </a:r>
-            <a:r>
-              <a:rPr lang="de-DE" dirty="0" err="1"/>
-              <a:t>Markets</a:t>
-            </a:r>
-            <a:r>
-              <a:rPr lang="de-DE" dirty="0"/>
-              <a:t> | 21.06.2023</a:t>
+              <a:t> | 22.06.2023</a:t>
             </a:r>
             <a:endParaRPr lang="en-US" dirty="0"/>
           </a:p>
@@ -5212,8 +5176,12 @@
           </a:lstStyle>
           <a:p>
             <a:r>
+              <a:rPr lang="de-DE" dirty="0"/>
+              <a:t>Máté Borvendég, Susanne Hantke | </a:t>
+            </a:r>
+            <a:r>
               <a:rPr lang="de-DE" dirty="0" err="1"/>
-              <a:t>Máté</a:t>
+              <a:t>Capacity</a:t>
             </a:r>
             <a:r>
               <a:rPr lang="de-DE" dirty="0"/>
@@ -5221,27 +5189,11 @@
             </a:r>
             <a:r>
               <a:rPr lang="de-DE" dirty="0" err="1"/>
-              <a:t>Borvendég</a:t>
+              <a:t>Markets</a:t>
             </a:r>
             <a:r>
               <a:rPr lang="de-DE" dirty="0"/>
-              <a:t>, Susanne Hantke | </a:t>
-            </a:r>
-            <a:r>
-              <a:rPr lang="de-DE" dirty="0" err="1"/>
-              <a:t>Capacity</a:t>
-            </a:r>
-            <a:r>
-              <a:rPr lang="de-DE" dirty="0"/>
-              <a:t> </a:t>
-            </a:r>
-            <a:r>
-              <a:rPr lang="de-DE" dirty="0" err="1"/>
-              <a:t>Markets</a:t>
-            </a:r>
-            <a:r>
-              <a:rPr lang="de-DE" dirty="0"/>
-              <a:t> | 21.06.2023</a:t>
+              <a:t> | 22.06.2023</a:t>
             </a:r>
             <a:endParaRPr lang="en-US" dirty="0"/>
           </a:p>
@@ -5565,8 +5517,12 @@
           </a:lstStyle>
           <a:p>
             <a:r>
+              <a:rPr lang="de-DE" dirty="0"/>
+              <a:t>Máté Borvendég, Susanne Hantke | </a:t>
+            </a:r>
+            <a:r>
               <a:rPr lang="de-DE" dirty="0" err="1"/>
-              <a:t>Máté</a:t>
+              <a:t>Capacity</a:t>
             </a:r>
             <a:r>
               <a:rPr lang="de-DE" dirty="0"/>
@@ -5574,27 +5530,11 @@
             </a:r>
             <a:r>
               <a:rPr lang="de-DE" dirty="0" err="1"/>
-              <a:t>Borvendég</a:t>
+              <a:t>Markets</a:t>
             </a:r>
             <a:r>
               <a:rPr lang="de-DE" dirty="0"/>
-              <a:t>, Susanne Hantke | </a:t>
-            </a:r>
-            <a:r>
-              <a:rPr lang="de-DE" dirty="0" err="1"/>
-              <a:t>Capacity</a:t>
-            </a:r>
-            <a:r>
-              <a:rPr lang="de-DE" dirty="0"/>
-              <a:t> </a:t>
-            </a:r>
-            <a:r>
-              <a:rPr lang="de-DE" dirty="0" err="1"/>
-              <a:t>Markets</a:t>
-            </a:r>
-            <a:r>
-              <a:rPr lang="de-DE" dirty="0"/>
-              <a:t> | 21.06.2023</a:t>
+              <a:t> | 22.06.2023</a:t>
             </a:r>
             <a:endParaRPr lang="en-US" dirty="0"/>
           </a:p>
@@ -5773,8 +5713,12 @@
           </a:lstStyle>
           <a:p>
             <a:r>
+              <a:rPr lang="de-DE" dirty="0"/>
+              <a:t>Máté Borvendég, Susanne Hantke | </a:t>
+            </a:r>
+            <a:r>
               <a:rPr lang="de-DE" dirty="0" err="1"/>
-              <a:t>Máté</a:t>
+              <a:t>Capacity</a:t>
             </a:r>
             <a:r>
               <a:rPr lang="de-DE" dirty="0"/>
@@ -5782,27 +5726,11 @@
             </a:r>
             <a:r>
               <a:rPr lang="de-DE" dirty="0" err="1"/>
-              <a:t>Borvendég</a:t>
+              <a:t>Markets</a:t>
             </a:r>
             <a:r>
               <a:rPr lang="de-DE" dirty="0"/>
-              <a:t>, Susanne Hantke | </a:t>
-            </a:r>
-            <a:r>
-              <a:rPr lang="de-DE" dirty="0" err="1"/>
-              <a:t>Capacity</a:t>
-            </a:r>
-            <a:r>
-              <a:rPr lang="de-DE" dirty="0"/>
-              <a:t> </a:t>
-            </a:r>
-            <a:r>
-              <a:rPr lang="de-DE" dirty="0" err="1"/>
-              <a:t>Markets</a:t>
-            </a:r>
-            <a:r>
-              <a:rPr lang="de-DE" dirty="0"/>
-              <a:t> | 21.06.2023</a:t>
+              <a:t> | 22.06.2023</a:t>
             </a:r>
             <a:endParaRPr lang="en-US" dirty="0"/>
           </a:p>
@@ -6121,8 +6049,12 @@
           </a:lstStyle>
           <a:p>
             <a:r>
+              <a:rPr lang="de-DE" dirty="0"/>
+              <a:t>Máté Borvendég, Susanne Hantke | </a:t>
+            </a:r>
+            <a:r>
               <a:rPr lang="de-DE" dirty="0" err="1"/>
-              <a:t>Máté</a:t>
+              <a:t>Capacity</a:t>
             </a:r>
             <a:r>
               <a:rPr lang="de-DE" dirty="0"/>
@@ -6130,27 +6062,11 @@
             </a:r>
             <a:r>
               <a:rPr lang="de-DE" dirty="0" err="1"/>
-              <a:t>Borvendég</a:t>
+              <a:t>Markets</a:t>
             </a:r>
             <a:r>
               <a:rPr lang="de-DE" dirty="0"/>
-              <a:t>, Susanne Hantke | </a:t>
-            </a:r>
-            <a:r>
-              <a:rPr lang="de-DE" dirty="0" err="1"/>
-              <a:t>Capacity</a:t>
-            </a:r>
-            <a:r>
-              <a:rPr lang="de-DE" dirty="0"/>
-              <a:t> </a:t>
-            </a:r>
-            <a:r>
-              <a:rPr lang="de-DE" dirty="0" err="1"/>
-              <a:t>Markets</a:t>
-            </a:r>
-            <a:r>
-              <a:rPr lang="de-DE" dirty="0"/>
-              <a:t> | 21.06.2023</a:t>
+              <a:t> | 22.06.2023</a:t>
             </a:r>
             <a:endParaRPr lang="en-US" dirty="0"/>
           </a:p>
@@ -8887,8 +8803,12 @@
           </a:lstStyle>
           <a:p>
             <a:r>
+              <a:rPr lang="de-DE" dirty="0"/>
+              <a:t>Máté Borvendég, Susanne Hantke | </a:t>
+            </a:r>
+            <a:r>
               <a:rPr lang="de-DE" dirty="0" err="1"/>
-              <a:t>Máté</a:t>
+              <a:t>Capacity</a:t>
             </a:r>
             <a:r>
               <a:rPr lang="de-DE" dirty="0"/>
@@ -8896,27 +8816,11 @@
             </a:r>
             <a:r>
               <a:rPr lang="de-DE" dirty="0" err="1"/>
-              <a:t>Borvendég</a:t>
+              <a:t>Markets</a:t>
             </a:r>
             <a:r>
               <a:rPr lang="de-DE" dirty="0"/>
-              <a:t>, Susanne Hantke | </a:t>
-            </a:r>
-            <a:r>
-              <a:rPr lang="de-DE" dirty="0" err="1"/>
-              <a:t>Capacity</a:t>
-            </a:r>
-            <a:r>
-              <a:rPr lang="de-DE" dirty="0"/>
-              <a:t> </a:t>
-            </a:r>
-            <a:r>
-              <a:rPr lang="de-DE" dirty="0" err="1"/>
-              <a:t>Markets</a:t>
-            </a:r>
-            <a:r>
-              <a:rPr lang="de-DE" dirty="0"/>
-              <a:t> | 21.06.2023</a:t>
+              <a:t> | 22.06.2023</a:t>
             </a:r>
             <a:endParaRPr lang="en-US" dirty="0"/>
           </a:p>
@@ -10753,8 +10657,12 @@
           </a:lstStyle>
           <a:p>
             <a:r>
+              <a:rPr lang="de-DE" dirty="0"/>
+              <a:t>Máté Borvendég, Susanne Hantke | </a:t>
+            </a:r>
+            <a:r>
               <a:rPr lang="de-DE" dirty="0" err="1"/>
-              <a:t>Máté</a:t>
+              <a:t>Capacity</a:t>
             </a:r>
             <a:r>
               <a:rPr lang="de-DE" dirty="0"/>
@@ -10762,27 +10670,11 @@
             </a:r>
             <a:r>
               <a:rPr lang="de-DE" dirty="0" err="1"/>
-              <a:t>Borvendég</a:t>
+              <a:t>Markets</a:t>
             </a:r>
             <a:r>
               <a:rPr lang="de-DE" dirty="0"/>
-              <a:t>, Susanne Hantke | </a:t>
-            </a:r>
-            <a:r>
-              <a:rPr lang="de-DE" dirty="0" err="1"/>
-              <a:t>Capacity</a:t>
-            </a:r>
-            <a:r>
-              <a:rPr lang="de-DE" dirty="0"/>
-              <a:t> </a:t>
-            </a:r>
-            <a:r>
-              <a:rPr lang="de-DE" dirty="0" err="1"/>
-              <a:t>Markets</a:t>
-            </a:r>
-            <a:r>
-              <a:rPr lang="de-DE" dirty="0"/>
-              <a:t> | 21.06.2023</a:t>
+              <a:t> | 22.06.2023</a:t>
             </a:r>
             <a:endParaRPr lang="en-US" dirty="0"/>
           </a:p>
@@ -13412,8 +13304,24 @@
           <a:lstStyle/>
           <a:p>
             <a:r>
-              <a:rPr lang="de-DE"/>
-              <a:t>Máté Borvendég, Susanne Hantke | Capacity Markets | 21.06.2023</a:t>
+              <a:rPr lang="de-DE" dirty="0"/>
+              <a:t>Máté Borvendég, Susanne Hantke | </a:t>
+            </a:r>
+            <a:r>
+              <a:rPr lang="de-DE" dirty="0" err="1"/>
+              <a:t>Capacity</a:t>
+            </a:r>
+            <a:r>
+              <a:rPr lang="de-DE" dirty="0"/>
+              <a:t> </a:t>
+            </a:r>
+            <a:r>
+              <a:rPr lang="de-DE" dirty="0" err="1"/>
+              <a:t>Markets</a:t>
+            </a:r>
+            <a:r>
+              <a:rPr lang="de-DE" dirty="0"/>
+              <a:t> | 22.06.2023</a:t>
             </a:r>
             <a:endParaRPr lang="en-US" dirty="0"/>
           </a:p>
@@ -13924,8 +13832,24 @@
           <a:lstStyle/>
           <a:p>
             <a:r>
-              <a:rPr lang="de-DE"/>
-              <a:t>Máté Borvendég, Susanne Hantke | Capacity Markets | 21.06.2023</a:t>
+              <a:rPr lang="de-DE" dirty="0"/>
+              <a:t>Máté Borvendég, Susanne Hantke | </a:t>
+            </a:r>
+            <a:r>
+              <a:rPr lang="de-DE" dirty="0" err="1"/>
+              <a:t>Capacity</a:t>
+            </a:r>
+            <a:r>
+              <a:rPr lang="de-DE" dirty="0"/>
+              <a:t> </a:t>
+            </a:r>
+            <a:r>
+              <a:rPr lang="de-DE" dirty="0" err="1"/>
+              <a:t>Markets</a:t>
+            </a:r>
+            <a:r>
+              <a:rPr lang="de-DE" dirty="0"/>
+              <a:t> | 22.06.2023</a:t>
             </a:r>
             <a:endParaRPr lang="en-US" dirty="0"/>
           </a:p>
@@ -14686,8 +14610,24 @@
           <a:lstStyle/>
           <a:p>
             <a:r>
-              <a:rPr lang="de-DE"/>
-              <a:t>Máté Borvendég, Susanne Hantke | Capacity Markets | 21.06.2023</a:t>
+              <a:rPr lang="de-DE" dirty="0"/>
+              <a:t>Máté Borvendég, Susanne Hantke | </a:t>
+            </a:r>
+            <a:r>
+              <a:rPr lang="de-DE" dirty="0" err="1"/>
+              <a:t>Capacity</a:t>
+            </a:r>
+            <a:r>
+              <a:rPr lang="de-DE" dirty="0"/>
+              <a:t> </a:t>
+            </a:r>
+            <a:r>
+              <a:rPr lang="de-DE" dirty="0" err="1"/>
+              <a:t>Markets</a:t>
+            </a:r>
+            <a:r>
+              <a:rPr lang="de-DE" dirty="0"/>
+              <a:t> | 22.06.2023</a:t>
             </a:r>
             <a:endParaRPr lang="en-US" dirty="0"/>
           </a:p>
@@ -15498,8 +15438,24 @@
           <a:lstStyle/>
           <a:p>
             <a:r>
-              <a:rPr lang="de-DE"/>
-              <a:t>Máté Borvendég, Susanne Hantke | Capacity Markets | 21.06.2023</a:t>
+              <a:rPr lang="de-DE" dirty="0"/>
+              <a:t>Máté Borvendég, Susanne Hantke | </a:t>
+            </a:r>
+            <a:r>
+              <a:rPr lang="de-DE" dirty="0" err="1"/>
+              <a:t>Capacity</a:t>
+            </a:r>
+            <a:r>
+              <a:rPr lang="de-DE" dirty="0"/>
+              <a:t> </a:t>
+            </a:r>
+            <a:r>
+              <a:rPr lang="de-DE" dirty="0" err="1"/>
+              <a:t>Markets</a:t>
+            </a:r>
+            <a:r>
+              <a:rPr lang="de-DE" dirty="0"/>
+              <a:t> | 22.06.2023</a:t>
             </a:r>
             <a:endParaRPr lang="en-US" dirty="0"/>
           </a:p>
@@ -15875,8 +15831,24 @@
           <a:lstStyle/>
           <a:p>
             <a:r>
-              <a:rPr lang="de-DE"/>
-              <a:t>Máté Borvendég, Susanne Hantke | Capacity Markets | 21.06.2023</a:t>
+              <a:rPr lang="de-DE" dirty="0"/>
+              <a:t>Máté Borvendég, Susanne Hantke | </a:t>
+            </a:r>
+            <a:r>
+              <a:rPr lang="de-DE" dirty="0" err="1"/>
+              <a:t>Capacity</a:t>
+            </a:r>
+            <a:r>
+              <a:rPr lang="de-DE" dirty="0"/>
+              <a:t> </a:t>
+            </a:r>
+            <a:r>
+              <a:rPr lang="de-DE" dirty="0" err="1"/>
+              <a:t>Markets</a:t>
+            </a:r>
+            <a:r>
+              <a:rPr lang="de-DE" dirty="0"/>
+              <a:t> | 22.06.2023</a:t>
             </a:r>
             <a:endParaRPr lang="en-US" dirty="0"/>
           </a:p>
@@ -16975,8 +16947,24 @@
           <a:lstStyle/>
           <a:p>
             <a:r>
-              <a:rPr lang="de-DE"/>
-              <a:t>Máté Borvendég, Susanne Hantke | Capacity Markets | 21.06.2023</a:t>
+              <a:rPr lang="de-DE" dirty="0"/>
+              <a:t>Máté Borvendég, Susanne Hantke | </a:t>
+            </a:r>
+            <a:r>
+              <a:rPr lang="de-DE" dirty="0" err="1"/>
+              <a:t>Capacity</a:t>
+            </a:r>
+            <a:r>
+              <a:rPr lang="de-DE" dirty="0"/>
+              <a:t> </a:t>
+            </a:r>
+            <a:r>
+              <a:rPr lang="de-DE" dirty="0" err="1"/>
+              <a:t>Markets</a:t>
+            </a:r>
+            <a:r>
+              <a:rPr lang="de-DE" dirty="0"/>
+              <a:t> | 22.06.2023</a:t>
             </a:r>
             <a:endParaRPr lang="en-US" dirty="0"/>
           </a:p>
@@ -17583,8 +17571,24 @@
           <a:lstStyle/>
           <a:p>
             <a:r>
-              <a:rPr lang="de-DE"/>
-              <a:t>Máté Borvendég, Susanne Hantke | Capacity Markets | 21.06.2023</a:t>
+              <a:rPr lang="de-DE" dirty="0"/>
+              <a:t>Máté Borvendég, Susanne Hantke | </a:t>
+            </a:r>
+            <a:r>
+              <a:rPr lang="de-DE" dirty="0" err="1"/>
+              <a:t>Capacity</a:t>
+            </a:r>
+            <a:r>
+              <a:rPr lang="de-DE" dirty="0"/>
+              <a:t> </a:t>
+            </a:r>
+            <a:r>
+              <a:rPr lang="de-DE" dirty="0" err="1"/>
+              <a:t>Markets</a:t>
+            </a:r>
+            <a:r>
+              <a:rPr lang="de-DE" dirty="0"/>
+              <a:t> | 22.06.2023</a:t>
             </a:r>
             <a:endParaRPr lang="en-US" dirty="0"/>
           </a:p>
@@ -17827,8 +17831,12 @@
           <a:lstStyle/>
           <a:p>
             <a:r>
+              <a:rPr lang="de-DE" dirty="0"/>
+              <a:t>Máté Borvendég, Susanne Hantke | </a:t>
+            </a:r>
+            <a:r>
               <a:rPr lang="de-DE" dirty="0" err="1"/>
-              <a:t>Máté</a:t>
+              <a:t>Capacity</a:t>
             </a:r>
             <a:r>
               <a:rPr lang="de-DE" dirty="0"/>
@@ -17836,27 +17844,11 @@
             </a:r>
             <a:r>
               <a:rPr lang="de-DE" dirty="0" err="1"/>
-              <a:t>Borvendég</a:t>
+              <a:t>Markets</a:t>
             </a:r>
             <a:r>
               <a:rPr lang="de-DE" dirty="0"/>
-              <a:t>, Susanne Hantke | </a:t>
-            </a:r>
-            <a:r>
-              <a:rPr lang="de-DE" dirty="0" err="1"/>
-              <a:t>Capacity</a:t>
-            </a:r>
-            <a:r>
-              <a:rPr lang="de-DE" dirty="0"/>
-              <a:t> </a:t>
-            </a:r>
-            <a:r>
-              <a:rPr lang="de-DE" dirty="0" err="1"/>
-              <a:t>Markets</a:t>
-            </a:r>
-            <a:r>
-              <a:rPr lang="de-DE" dirty="0"/>
-              <a:t> | 21.06.2023</a:t>
+              <a:t> | 22.06.2023</a:t>
             </a:r>
             <a:endParaRPr lang="en-US" dirty="0"/>
           </a:p>
@@ -17977,8 +17969,12 @@
           <a:lstStyle/>
           <a:p>
             <a:r>
+              <a:rPr lang="de-DE" dirty="0"/>
+              <a:t>Máté Borvendég, Susanne Hantke | </a:t>
+            </a:r>
+            <a:r>
               <a:rPr lang="de-DE" dirty="0" err="1"/>
-              <a:t>Máté</a:t>
+              <a:t>Capacity</a:t>
             </a:r>
             <a:r>
               <a:rPr lang="de-DE" dirty="0"/>
@@ -17986,27 +17982,11 @@
             </a:r>
             <a:r>
               <a:rPr lang="de-DE" dirty="0" err="1"/>
-              <a:t>Borvendég</a:t>
+              <a:t>Markets</a:t>
             </a:r>
             <a:r>
               <a:rPr lang="de-DE" dirty="0"/>
-              <a:t>, Susanne Hantke | </a:t>
-            </a:r>
-            <a:r>
-              <a:rPr lang="de-DE" dirty="0" err="1"/>
-              <a:t>Capacity</a:t>
-            </a:r>
-            <a:r>
-              <a:rPr lang="de-DE" dirty="0"/>
-              <a:t> </a:t>
-            </a:r>
-            <a:r>
-              <a:rPr lang="de-DE" dirty="0" err="1"/>
-              <a:t>Markets</a:t>
-            </a:r>
-            <a:r>
-              <a:rPr lang="de-DE" dirty="0"/>
-              <a:t> | 21.06.2023</a:t>
+              <a:t> | 22.06.2023</a:t>
             </a:r>
             <a:endParaRPr lang="en-US" dirty="0"/>
           </a:p>
@@ -18331,8 +18311,12 @@
           <a:lstStyle/>
           <a:p>
             <a:r>
+              <a:rPr lang="de-DE" dirty="0"/>
+              <a:t>Máté Borvendég, Susanne Hantke | </a:t>
+            </a:r>
+            <a:r>
               <a:rPr lang="de-DE" dirty="0" err="1"/>
-              <a:t>Máté</a:t>
+              <a:t>Capacity</a:t>
             </a:r>
             <a:r>
               <a:rPr lang="de-DE" dirty="0"/>
@@ -18340,27 +18324,11 @@
             </a:r>
             <a:r>
               <a:rPr lang="de-DE" dirty="0" err="1"/>
-              <a:t>Borvendég</a:t>
+              <a:t>Markets</a:t>
             </a:r>
             <a:r>
               <a:rPr lang="de-DE" dirty="0"/>
-              <a:t>, Susanne Hantke | </a:t>
-            </a:r>
-            <a:r>
-              <a:rPr lang="de-DE" dirty="0" err="1"/>
-              <a:t>Capacity</a:t>
-            </a:r>
-            <a:r>
-              <a:rPr lang="de-DE" dirty="0"/>
-              <a:t> </a:t>
-            </a:r>
-            <a:r>
-              <a:rPr lang="de-DE" dirty="0" err="1"/>
-              <a:t>Markets</a:t>
-            </a:r>
-            <a:r>
-              <a:rPr lang="de-DE" dirty="0"/>
-              <a:t> | 21.06.2023</a:t>
+              <a:t> | 22.06.2023</a:t>
             </a:r>
             <a:endParaRPr lang="en-US" dirty="0"/>
           </a:p>
@@ -18506,8 +18474,12 @@
           <a:lstStyle/>
           <a:p>
             <a:r>
+              <a:rPr lang="de-DE" dirty="0"/>
+              <a:t>Máté Borvendég, Susanne Hantke | </a:t>
+            </a:r>
+            <a:r>
               <a:rPr lang="de-DE" dirty="0" err="1"/>
-              <a:t>Máté</a:t>
+              <a:t>Capacity</a:t>
             </a:r>
             <a:r>
               <a:rPr lang="de-DE" dirty="0"/>
@@ -18515,27 +18487,11 @@
             </a:r>
             <a:r>
               <a:rPr lang="de-DE" dirty="0" err="1"/>
-              <a:t>Borvendég</a:t>
+              <a:t>Markets</a:t>
             </a:r>
             <a:r>
               <a:rPr lang="de-DE" dirty="0"/>
-              <a:t>, Susanne Hantke | </a:t>
-            </a:r>
-            <a:r>
-              <a:rPr lang="de-DE" dirty="0" err="1"/>
-              <a:t>Capacity</a:t>
-            </a:r>
-            <a:r>
-              <a:rPr lang="de-DE" dirty="0"/>
-              <a:t> </a:t>
-            </a:r>
-            <a:r>
-              <a:rPr lang="de-DE" dirty="0" err="1"/>
-              <a:t>Markets</a:t>
-            </a:r>
-            <a:r>
-              <a:rPr lang="de-DE" dirty="0"/>
-              <a:t> | 21.06.2023</a:t>
+              <a:t> | 22.06.2023</a:t>
             </a:r>
             <a:endParaRPr lang="en-US" dirty="0"/>
           </a:p>
@@ -18694,8 +18650,12 @@
           <a:lstStyle/>
           <a:p>
             <a:r>
+              <a:rPr lang="de-DE" dirty="0"/>
+              <a:t>Máté Borvendég, Susanne Hantke | </a:t>
+            </a:r>
+            <a:r>
               <a:rPr lang="de-DE" dirty="0" err="1"/>
-              <a:t>Máté</a:t>
+              <a:t>Capacity</a:t>
             </a:r>
             <a:r>
               <a:rPr lang="de-DE" dirty="0"/>
@@ -18703,27 +18663,11 @@
             </a:r>
             <a:r>
               <a:rPr lang="de-DE" dirty="0" err="1"/>
-              <a:t>Borvendég</a:t>
+              <a:t>Markets</a:t>
             </a:r>
             <a:r>
               <a:rPr lang="de-DE" dirty="0"/>
-              <a:t>, Susanne Hantke | </a:t>
-            </a:r>
-            <a:r>
-              <a:rPr lang="de-DE" dirty="0" err="1"/>
-              <a:t>Capacity</a:t>
-            </a:r>
-            <a:r>
-              <a:rPr lang="de-DE" dirty="0"/>
-              <a:t> </a:t>
-            </a:r>
-            <a:r>
-              <a:rPr lang="de-DE" dirty="0" err="1"/>
-              <a:t>Markets</a:t>
-            </a:r>
-            <a:r>
-              <a:rPr lang="de-DE" dirty="0"/>
-              <a:t> | 21.06.2023</a:t>
+              <a:t> | 22.06.2023</a:t>
             </a:r>
             <a:endParaRPr lang="en-US" dirty="0"/>
           </a:p>
@@ -18991,8 +18935,12 @@
           <a:lstStyle/>
           <a:p>
             <a:r>
+              <a:rPr lang="de-DE" dirty="0"/>
+              <a:t>Máté Borvendég, Susanne Hantke | </a:t>
+            </a:r>
+            <a:r>
               <a:rPr lang="de-DE" dirty="0" err="1"/>
-              <a:t>Máté</a:t>
+              <a:t>Capacity</a:t>
             </a:r>
             <a:r>
               <a:rPr lang="de-DE" dirty="0"/>
@@ -19000,27 +18948,11 @@
             </a:r>
             <a:r>
               <a:rPr lang="de-DE" dirty="0" err="1"/>
-              <a:t>Borvendég</a:t>
+              <a:t>Markets</a:t>
             </a:r>
             <a:r>
               <a:rPr lang="de-DE" dirty="0"/>
-              <a:t>, Susanne Hantke | </a:t>
-            </a:r>
-            <a:r>
-              <a:rPr lang="de-DE" dirty="0" err="1"/>
-              <a:t>Capacity</a:t>
-            </a:r>
-            <a:r>
-              <a:rPr lang="de-DE" dirty="0"/>
-              <a:t> </a:t>
-            </a:r>
-            <a:r>
-              <a:rPr lang="de-DE" dirty="0" err="1"/>
-              <a:t>Markets</a:t>
-            </a:r>
-            <a:r>
-              <a:rPr lang="de-DE" dirty="0"/>
-              <a:t> | 21.06.2023</a:t>
+              <a:t> | 22.06.2023</a:t>
             </a:r>
             <a:endParaRPr lang="en-US" dirty="0"/>
           </a:p>
@@ -20339,8 +20271,12 @@
           <a:lstStyle/>
           <a:p>
             <a:r>
+              <a:rPr lang="de-DE" dirty="0"/>
+              <a:t>Máté Borvendég, Susanne Hantke | </a:t>
+            </a:r>
+            <a:r>
               <a:rPr lang="de-DE" dirty="0" err="1"/>
-              <a:t>Máté</a:t>
+              <a:t>Capacity</a:t>
             </a:r>
             <a:r>
               <a:rPr lang="de-DE" dirty="0"/>
@@ -20348,27 +20284,11 @@
             </a:r>
             <a:r>
               <a:rPr lang="de-DE" dirty="0" err="1"/>
-              <a:t>Borvendég</a:t>
+              <a:t>Markets</a:t>
             </a:r>
             <a:r>
               <a:rPr lang="de-DE" dirty="0"/>
-              <a:t>, Susanne Hantke | </a:t>
-            </a:r>
-            <a:r>
-              <a:rPr lang="de-DE" dirty="0" err="1"/>
-              <a:t>Capacity</a:t>
-            </a:r>
-            <a:r>
-              <a:rPr lang="de-DE" dirty="0"/>
-              <a:t> </a:t>
-            </a:r>
-            <a:r>
-              <a:rPr lang="de-DE" dirty="0" err="1"/>
-              <a:t>Markets</a:t>
-            </a:r>
-            <a:r>
-              <a:rPr lang="de-DE" dirty="0"/>
-              <a:t> | 21.06.2023</a:t>
+              <a:t> | 22.06.2023</a:t>
             </a:r>
             <a:endParaRPr lang="en-US" dirty="0"/>
           </a:p>
@@ -21391,8 +21311,12 @@
           <a:lstStyle/>
           <a:p>
             <a:r>
+              <a:rPr lang="de-DE" dirty="0"/>
+              <a:t>Máté Borvendég, Susanne Hantke | </a:t>
+            </a:r>
+            <a:r>
               <a:rPr lang="de-DE" dirty="0" err="1"/>
-              <a:t>Máté</a:t>
+              <a:t>Capacity</a:t>
             </a:r>
             <a:r>
               <a:rPr lang="de-DE" dirty="0"/>
@@ -21400,27 +21324,11 @@
             </a:r>
             <a:r>
               <a:rPr lang="de-DE" dirty="0" err="1"/>
-              <a:t>Borvendég</a:t>
+              <a:t>Markets</a:t>
             </a:r>
             <a:r>
               <a:rPr lang="de-DE" dirty="0"/>
-              <a:t>, Susanne Hantke | </a:t>
-            </a:r>
-            <a:r>
-              <a:rPr lang="de-DE" dirty="0" err="1"/>
-              <a:t>Capacity</a:t>
-            </a:r>
-            <a:r>
-              <a:rPr lang="de-DE" dirty="0"/>
-              <a:t> </a:t>
-            </a:r>
-            <a:r>
-              <a:rPr lang="de-DE" dirty="0" err="1"/>
-              <a:t>Markets</a:t>
-            </a:r>
-            <a:r>
-              <a:rPr lang="de-DE" dirty="0"/>
-              <a:t> | 21.06.2023</a:t>
+              <a:t> | 22.06.2023</a:t>
             </a:r>
             <a:endParaRPr lang="en-US" dirty="0"/>
           </a:p>
@@ -23779,8 +23687,12 @@
           <a:lstStyle/>
           <a:p>
             <a:r>
+              <a:rPr lang="de-DE" dirty="0"/>
+              <a:t>Máté Borvendég, Susanne Hantke | </a:t>
+            </a:r>
+            <a:r>
               <a:rPr lang="de-DE" dirty="0" err="1"/>
-              <a:t>Máté</a:t>
+              <a:t>Capacity</a:t>
             </a:r>
             <a:r>
               <a:rPr lang="de-DE" dirty="0"/>
@@ -23788,27 +23700,11 @@
             </a:r>
             <a:r>
               <a:rPr lang="de-DE" dirty="0" err="1"/>
-              <a:t>Borvendég</a:t>
+              <a:t>Markets</a:t>
             </a:r>
             <a:r>
               <a:rPr lang="de-DE" dirty="0"/>
-              <a:t>, Susanne Hantke | </a:t>
-            </a:r>
-            <a:r>
-              <a:rPr lang="de-DE" dirty="0" err="1"/>
-              <a:t>Capacity</a:t>
-            </a:r>
-            <a:r>
-              <a:rPr lang="de-DE" dirty="0"/>
-              <a:t> </a:t>
-            </a:r>
-            <a:r>
-              <a:rPr lang="de-DE" dirty="0" err="1"/>
-              <a:t>Markets</a:t>
-            </a:r>
-            <a:r>
-              <a:rPr lang="de-DE" dirty="0"/>
-              <a:t> | 21.06.2023</a:t>
+              <a:t> | 22.06.2023</a:t>
             </a:r>
             <a:endParaRPr lang="en-US" dirty="0"/>
           </a:p>
@@ -25085,8 +24981,24 @@
           <a:lstStyle/>
           <a:p>
             <a:r>
-              <a:rPr lang="de-DE"/>
-              <a:t>Máté Borvendég, Susanne Hantke | Capacity Markets | 21.06.2023</a:t>
+              <a:rPr lang="de-DE" dirty="0"/>
+              <a:t>Máté Borvendég, Susanne Hantke | </a:t>
+            </a:r>
+            <a:r>
+              <a:rPr lang="de-DE" dirty="0" err="1"/>
+              <a:t>Capacity</a:t>
+            </a:r>
+            <a:r>
+              <a:rPr lang="de-DE" dirty="0"/>
+              <a:t> </a:t>
+            </a:r>
+            <a:r>
+              <a:rPr lang="de-DE" dirty="0" err="1"/>
+              <a:t>Markets</a:t>
+            </a:r>
+            <a:r>
+              <a:rPr lang="de-DE" dirty="0"/>
+              <a:t> | 22.06.2023</a:t>
             </a:r>
             <a:endParaRPr lang="en-US" dirty="0"/>
           </a:p>
@@ -25141,8 +25053,8 @@
           </a:p>
         </p:txBody>
       </p:sp>
-      <mc:AlternateContent xmlns:mc="http://schemas.openxmlformats.org/markup-compatibility/2006">
-        <mc:Choice xmlns:a14="http://schemas.microsoft.com/office/drawing/2010/main" Requires="a14">
+      <mc:AlternateContent xmlns:mc="http://schemas.openxmlformats.org/markup-compatibility/2006" xmlns:a14="http://schemas.microsoft.com/office/drawing/2010/main">
+        <mc:Choice Requires="a14">
           <p:sp>
             <p:nvSpPr>
               <p:cNvPr id="6" name="Rechteck 5">
@@ -25622,7 +25534,7 @@
             </p:txBody>
           </p:sp>
         </mc:Choice>
-        <mc:Fallback>
+        <mc:Fallback xmlns="">
           <p:sp>
             <p:nvSpPr>
               <p:cNvPr id="6" name="Rechteck 5">
@@ -25672,8 +25584,8 @@
           </p:sp>
         </mc:Fallback>
       </mc:AlternateContent>
-      <mc:AlternateContent xmlns:mc="http://schemas.openxmlformats.org/markup-compatibility/2006">
-        <mc:Choice xmlns:a14="http://schemas.microsoft.com/office/drawing/2010/main" Requires="a14">
+      <mc:AlternateContent xmlns:mc="http://schemas.openxmlformats.org/markup-compatibility/2006" xmlns:a14="http://schemas.microsoft.com/office/drawing/2010/main">
+        <mc:Choice Requires="a14">
           <p:sp>
             <p:nvSpPr>
               <p:cNvPr id="7" name="Textfeld 6">
@@ -25747,13 +25659,7 @@
                           <a:rPr lang="hu-HU" sz="1600" b="0" i="1" smtClean="0">
                             <a:latin typeface="Cambria Math" panose="02040503050406030204" pitchFamily="18" charset="0"/>
                           </a:rPr>
-                          <m:t>1</m:t>
-                        </m:r>
-                        <m:r>
-                          <a:rPr lang="hu-HU" sz="1600" b="0" i="1" smtClean="0">
-                            <a:latin typeface="Cambria Math" panose="02040503050406030204" pitchFamily="18" charset="0"/>
-                          </a:rPr>
-                          <m:t>,</m:t>
+                          <m:t>1,</m:t>
                         </m:r>
                         <m:r>
                           <a:rPr lang="hu-HU" sz="1600" b="0" i="1" smtClean="0">
@@ -25867,7 +25773,7 @@
             </p:txBody>
           </p:sp>
         </mc:Choice>
-        <mc:Fallback>
+        <mc:Fallback xmlns="">
           <p:sp>
             <p:nvSpPr>
               <p:cNvPr id="7" name="Textfeld 6">
@@ -26614,7 +26520,7 @@
           <a:p>
             <a:r>
               <a:rPr lang="en-GB" dirty="0"/>
-              <a:t>Máté Borvendég, Susanne Hantke | Capacity Markets | 21.06.2023</a:t>
+              <a:t>Máté Borvendég, Susanne Hantke | Capacity Markets | 22.06.2023</a:t>
             </a:r>
           </a:p>
         </p:txBody>
@@ -27490,8 +27396,12 @@
           <a:lstStyle/>
           <a:p>
             <a:r>
+              <a:rPr lang="de-DE" dirty="0"/>
+              <a:t>Máté Borvendég, Susanne Hantke | </a:t>
+            </a:r>
+            <a:r>
               <a:rPr lang="de-DE" dirty="0" err="1"/>
-              <a:t>Máté</a:t>
+              <a:t>Capacity</a:t>
             </a:r>
             <a:r>
               <a:rPr lang="de-DE" dirty="0"/>
@@ -27499,27 +27409,11 @@
             </a:r>
             <a:r>
               <a:rPr lang="de-DE" dirty="0" err="1"/>
-              <a:t>Borvendég</a:t>
+              <a:t>Markets</a:t>
             </a:r>
             <a:r>
               <a:rPr lang="de-DE" dirty="0"/>
-              <a:t>, Susanne Hantke | </a:t>
-            </a:r>
-            <a:r>
-              <a:rPr lang="de-DE" dirty="0" err="1"/>
-              <a:t>Capacity</a:t>
-            </a:r>
-            <a:r>
-              <a:rPr lang="de-DE" dirty="0"/>
-              <a:t> </a:t>
-            </a:r>
-            <a:r>
-              <a:rPr lang="de-DE" dirty="0" err="1"/>
-              <a:t>Markets</a:t>
-            </a:r>
-            <a:r>
-              <a:rPr lang="de-DE" dirty="0"/>
-              <a:t> | 21.06.2023</a:t>
+              <a:t> | 22.06.2023</a:t>
             </a:r>
             <a:endParaRPr lang="en-US" dirty="0"/>
           </a:p>
@@ -27968,8 +27862,12 @@
           <a:lstStyle/>
           <a:p>
             <a:r>
+              <a:rPr lang="de-DE" dirty="0"/>
+              <a:t>Máté Borvendég, Susanne Hantke | </a:t>
+            </a:r>
+            <a:r>
               <a:rPr lang="de-DE" dirty="0" err="1"/>
-              <a:t>Máté</a:t>
+              <a:t>Capacity</a:t>
             </a:r>
             <a:r>
               <a:rPr lang="de-DE" dirty="0"/>
@@ -27977,27 +27875,11 @@
             </a:r>
             <a:r>
               <a:rPr lang="de-DE" dirty="0" err="1"/>
-              <a:t>Borvendég</a:t>
+              <a:t>Markets</a:t>
             </a:r>
             <a:r>
               <a:rPr lang="de-DE" dirty="0"/>
-              <a:t>, Susanne Hantke | </a:t>
-            </a:r>
-            <a:r>
-              <a:rPr lang="de-DE" dirty="0" err="1"/>
-              <a:t>Capacity</a:t>
-            </a:r>
-            <a:r>
-              <a:rPr lang="de-DE" dirty="0"/>
-              <a:t> </a:t>
-            </a:r>
-            <a:r>
-              <a:rPr lang="de-DE" dirty="0" err="1"/>
-              <a:t>Markets</a:t>
-            </a:r>
-            <a:r>
-              <a:rPr lang="de-DE" dirty="0"/>
-              <a:t> | 21.06.2023</a:t>
+              <a:t> | 22.06.2023</a:t>
             </a:r>
             <a:endParaRPr lang="en-US" dirty="0"/>
           </a:p>
@@ -28457,8 +28339,24 @@
           <a:lstStyle/>
           <a:p>
             <a:r>
-              <a:rPr lang="de-DE"/>
-              <a:t>Máté Borvendég, Susanne Hantke | Capacity Markets | 21.06.2023</a:t>
+              <a:rPr lang="de-DE" dirty="0"/>
+              <a:t>Máté Borvendég, Susanne Hantke | </a:t>
+            </a:r>
+            <a:r>
+              <a:rPr lang="de-DE" dirty="0" err="1"/>
+              <a:t>Capacity</a:t>
+            </a:r>
+            <a:r>
+              <a:rPr lang="de-DE" dirty="0"/>
+              <a:t> </a:t>
+            </a:r>
+            <a:r>
+              <a:rPr lang="de-DE" dirty="0" err="1"/>
+              <a:t>Markets</a:t>
+            </a:r>
+            <a:r>
+              <a:rPr lang="de-DE" dirty="0"/>
+              <a:t> | 22.06.2023</a:t>
             </a:r>
             <a:endParaRPr lang="en-US" dirty="0"/>
           </a:p>

</xml_diff>